<commit_message>
Deploying to gh-pages from @ ManuelePasini/slides-markdown@f79a7269987966b204d5b5d51d57b52946a7e652 🚀
</commit_message>
<xml_diff>
--- a/graph_llm.pptx
+++ b/graph_llm.pptx
@@ -3233,12 +3233,31 @@
           <a:bodyPr/>
           <a:lstStyle/>
           <a:p>
-            <a:pPr lvl="0" indent="0" marL="0">
-              <a:buNone/>
-            </a:pPr>
+            <a:pPr lvl="0"/>
             <a:r>
               <a:rPr/>
-              <a:t>Three types of graphs: - Pure Graphs without Textual Information - Text-Attributed Graphs: nodes or edges are associated with semantically rich text information - Text-Paired Graphs: have textual descriptions defined for the entire graph structure.</a:t>
+              <a:t>Three types of graphs:</a:t>
+            </a:r>
+          </a:p>
+          <a:p>
+            <a:pPr lvl="1"/>
+            <a:r>
+              <a:rPr/>
+              <a:t>Pure Graphs without Textual Information</a:t>
+            </a:r>
+          </a:p>
+          <a:p>
+            <a:pPr lvl="1"/>
+            <a:r>
+              <a:rPr/>
+              <a:t>Text-Attributed Graphs: nodes or edges are associated with semantically rich text information</a:t>
+            </a:r>
+          </a:p>
+          <a:p>
+            <a:pPr lvl="1"/>
+            <a:r>
+              <a:rPr/>
+              <a:t>Text-Paired Graphs: have textual descriptions defined for the entire graph structure.</a:t>
             </a:r>
           </a:p>
         </p:txBody>
@@ -3305,30 +3324,28 @@
           <a:bodyPr/>
           <a:lstStyle/>
           <a:p>
-            <a:pPr lvl="0" indent="0" marL="0">
-              <a:buNone/>
-            </a:pPr>
+            <a:pPr lvl="0"/>
             <a:r>
               <a:rPr/>
               <a:t>** Input graph into LLM **:</a:t>
             </a:r>
           </a:p>
           <a:p>
-            <a:pPr lvl="0"/>
+            <a:pPr lvl="1"/>
             <a:r>
               <a:rPr/>
               <a:t>Plainly verbailizing graph: Verbalizing the graph structure in natural language (e.g., describe edges and adjacency lists)</a:t>
             </a:r>
           </a:p>
           <a:p>
-            <a:pPr lvl="0"/>
+            <a:pPr lvl="1"/>
             <a:r>
               <a:rPr/>
               <a:t>Paraphrasing graph: paraphrase the graph structure into more natural or concise sentences.</a:t>
             </a:r>
           </a:p>
           <a:p>
-            <a:pPr lvl="1" indent="0">
+            <a:pPr lvl="2" indent="0">
               <a:buNone/>
             </a:pPr>
             <a:r>
@@ -3341,7 +3358,7 @@
             </a:r>
           </a:p>
           <a:p>
-            <a:pPr lvl="0"/>
+            <a:pPr lvl="1"/>
             <a:r>
               <a:rPr/>
               <a:t> Encoding Graphs Into Implicit Feature Sequences : Usually train a graph encoder to encode the graph structure into a sequence of features and fine-tuning the LLMs to adapt to the new input format.</a:t>
@@ -3416,7 +3433,7 @@
             </a:pPr>
             <a:r>
               <a:rPr/>
-              <a:t>** Applications **</a:t>
+              <a:t>** Applications - Pure graphs **</a:t>
             </a:r>
           </a:p>
           <a:p>
@@ -3511,9 +3528,7 @@
             </a:r>
           </a:p>
           <a:p>
-            <a:pPr lvl="0" indent="0" marL="0">
-              <a:buNone/>
-            </a:pPr>
+            <a:pPr lvl="0"/>
             <a:r>
               <a:rPr/>
               <a:t>** Overall, no consensus on how to represent graphs **</a:t>

</xml_diff>

<commit_message>
Deploying to gh-pages from @ ManuelePasini/slides-markdown@3ac0f22b83784af4ef9266de63408bc78dd8132d 🚀
</commit_message>
<xml_diff>
--- a/graph_llm.pptx
+++ b/graph_llm.pptx
@@ -3326,8 +3326,12 @@
           <a:p>
             <a:pPr lvl="0"/>
             <a:r>
+              <a:rPr b="1"/>
+              <a:t>Input graph into LLM</a:t>
+            </a:r>
+            <a:r>
               <a:rPr/>
-              <a:t>** Input graph into LLM **:</a:t>
+              <a:t>:</a:t>
             </a:r>
           </a:p>
           <a:p>
@@ -3429,11 +3433,14 @@
           <a:lstStyle/>
           <a:p>
             <a:pPr lvl="0" indent="0" marL="0">
+              <a:spcBef>
+                <a:spcPts val="3000"/>
+              </a:spcBef>
               <a:buNone/>
             </a:pPr>
             <a:r>
-              <a:rPr/>
-              <a:t>** Applications - Pure graphs **</a:t>
+              <a:rPr b="1"/>
+              <a:t>Applications - Pure graphs</a:t>
             </a:r>
           </a:p>
           <a:p>
@@ -3496,14 +3503,14 @@
             <a:pPr lvl="2"/>
             <a:r>
               <a:rPr/>
-              <a:t>Build-a-Graph: encourages LLMs to reconstruct the relevant graph structures and then perform reasoning on them. This</a:t>
+              <a:t>Build-a-Graph: reconstruct the relevant graph structures and then perform reasoning on them. This</a:t>
             </a:r>
           </a:p>
           <a:p>
             <a:pPr lvl="2"/>
             <a:r>
               <a:rPr/>
-              <a:t>Context-Summarization: encourages LLMs to summarize the key nodes, edges, or sub-graphs and perform reasoning.</a:t>
+              <a:t>Context-Summarization: summarize the key nodes, edges, or sub-graphs and perform reasoning.</a:t>
             </a:r>
           </a:p>
           <a:p>
@@ -3530,8 +3537,8 @@
           <a:p>
             <a:pPr lvl="0"/>
             <a:r>
-              <a:rPr/>
-              <a:t>** Overall, no consensus on how to represent graphs **</a:t>
+              <a:rPr b="1"/>
+              <a:t>Overall, no consensus on how to represent graphs</a:t>
             </a:r>
           </a:p>
         </p:txBody>

</xml_diff>

<commit_message>
Deploying to gh-pages from @ ManuelePasini/slides-markdown@9fbf10432603ed284f2313c72ed007f777071e8e 🚀
</commit_message>
<xml_diff>
--- a/graph_llm.pptx
+++ b/graph_llm.pptx
@@ -9,6 +9,7 @@
     <p:sldId id="257" r:id="rId3"/>
     <p:sldId id="258" r:id="rId4"/>
     <p:sldId id="259" r:id="rId5"/>
+    <p:sldId id="260" r:id="rId6"/>
   </p:sldIdLst>
   <p:sldSz cx="9144000" cy="5143500" type="screen16x9"/>
   <p:notesSz cx="6858000" cy="9144000"/>
@@ -3213,7 +3214,7 @@
             </a:pPr>
             <a:r>
               <a:rPr/>
-              <a:t>Large Language Models on Graphs: A Comprehensive Survey - TDKE, December 2024</a:t>
+              <a:t>Surveys</a:t>
             </a:r>
           </a:p>
         </p:txBody>
@@ -3236,28 +3237,56 @@
             <a:pPr lvl="0"/>
             <a:r>
               <a:rPr/>
-              <a:t>Three types of graphs:</a:t>
-            </a:r>
-          </a:p>
-          <a:p>
-            <a:pPr lvl="1"/>
+              <a:t>Unifying Large Language Models and Knowledge Graphs: A Roadmap - TKDE, 2023</a:t>
+            </a:r>
+          </a:p>
+          <a:p>
+            <a:pPr lvl="0"/>
             <a:r>
               <a:rPr/>
-              <a:t>Pure Graphs without Textual Information</a:t>
-            </a:r>
-          </a:p>
-          <a:p>
-            <a:pPr lvl="1"/>
+              <a:t>A survey on augmenting knowledge graphs (KGs) with large language models (LLMs): models, evaluation metrics, benchmarks, and challenges - Discover artificial intelligence, 2024</a:t>
+            </a:r>
+          </a:p>
+          <a:p>
+            <a:pPr lvl="0"/>
             <a:r>
               <a:rPr/>
-              <a:t>Text-Attributed Graphs: nodes or edges are associated with semantically rich text information</a:t>
-            </a:r>
-          </a:p>
-          <a:p>
-            <a:pPr lvl="1"/>
+              <a:t>Graph Retrieval-Augmented Generation for Large Language Models: A Survey - Conference on AI, Science, Engineering, and Technology (AIxSET), 2024</a:t>
+            </a:r>
+          </a:p>
+          <a:p>
+            <a:pPr lvl="0"/>
             <a:r>
               <a:rPr/>
-              <a:t>Text-Paired Graphs: have textual descriptions defined for the entire graph structure.</a:t>
+              <a:t>A Survey of Large Language Models for Graphs - KDD 2024</a:t>
+            </a:r>
+          </a:p>
+          <a:p>
+            <a:pPr lvl="0"/>
+            <a:r>
+              <a:rPr/>
+              <a:t>Research Trends for the Interplay between Large Language Models and Knowledge Graphs - PVLD, 2024</a:t>
+            </a:r>
+          </a:p>
+          <a:p>
+            <a:pPr lvl="0"/>
+            <a:r>
+              <a:rPr/>
+              <a:t>Think-on-Graph: Deep and Responsible Reasoning of Large Language Model on Knowledge Graph - ICLR 2024</a:t>
+            </a:r>
+          </a:p>
+          <a:p>
+            <a:pPr lvl="0"/>
+            <a:r>
+              <a:rPr/>
+              <a:t>A survey of large language models for data challenges in graphs - Expert systems with Applications, 2025</a:t>
+            </a:r>
+          </a:p>
+          <a:p>
+            <a:pPr lvl="0"/>
+            <a:r>
+              <a:rPr/>
+              <a:t>Bring Your Own Knowledge: A Survey of Methods for LLM Knowledge Expansion - ??, 2025</a:t>
             </a:r>
           </a:p>
         </p:txBody>
@@ -3304,7 +3333,98 @@
             </a:pPr>
             <a:r>
               <a:rPr/>
-              <a:t>Large Language Models on Graphs: A Comprehensive Survey - TDKE, December 2024</a:t>
+              <a:t>Large Language Models on Graphs: A Comprehensive Survey - TKDE, December 2024</a:t>
+            </a:r>
+          </a:p>
+        </p:txBody>
+      </p:sp>
+      <p:sp>
+        <p:nvSpPr>
+          <p:cNvPr id="3" name="Content Placeholder 2"/>
+          <p:cNvSpPr>
+            <a:spLocks noGrp="1"/>
+          </p:cNvSpPr>
+          <p:nvPr>
+            <p:ph idx="1"/>
+          </p:nvPr>
+        </p:nvSpPr>
+        <p:spPr/>
+        <p:txBody>
+          <a:bodyPr/>
+          <a:lstStyle/>
+          <a:p>
+            <a:pPr lvl="0"/>
+            <a:r>
+              <a:rPr/>
+              <a:t>Three types of graphs:</a:t>
+            </a:r>
+          </a:p>
+          <a:p>
+            <a:pPr lvl="1"/>
+            <a:r>
+              <a:rPr/>
+              <a:t>Pure Graphs without Textual Information</a:t>
+            </a:r>
+          </a:p>
+          <a:p>
+            <a:pPr lvl="1"/>
+            <a:r>
+              <a:rPr/>
+              <a:t>Text-Attributed Graphs: nodes or edges are associated with semantically rich text information</a:t>
+            </a:r>
+          </a:p>
+          <a:p>
+            <a:pPr lvl="1"/>
+            <a:r>
+              <a:rPr/>
+              <a:t>Text-Paired Graphs: have textual descriptions defined for the entire graph structure.</a:t>
+            </a:r>
+          </a:p>
+        </p:txBody>
+      </p:sp>
+    </p:spTree>
+  </p:cSld>
+</p:sld>
+</file>
+
+<file path=ppt/slides/slide4.xml><?xml version="1.0" encoding="utf-8"?>
+<p:sld xmlns:a="http://schemas.openxmlformats.org/drawingml/2006/main" xmlns:r="http://schemas.openxmlformats.org/officeDocument/2006/relationships" xmlns:p="http://schemas.openxmlformats.org/presentationml/2006/main">
+  <p:cSld>
+    <p:spTree>
+      <p:nvGrpSpPr>
+        <p:cNvPr id="1" name=""/>
+        <p:cNvGrpSpPr/>
+        <p:nvPr/>
+      </p:nvGrpSpPr>
+      <p:grpSpPr>
+        <a:xfrm>
+          <a:off x="0" y="0"/>
+          <a:ext cx="0" cy="0"/>
+          <a:chOff x="0" y="0"/>
+          <a:chExt cx="0" cy="0"/>
+        </a:xfrm>
+      </p:grpSpPr>
+      <p:sp>
+        <p:nvSpPr>
+          <p:cNvPr id="2" name="Title 1"/>
+          <p:cNvSpPr>
+            <a:spLocks noGrp="1"/>
+          </p:cNvSpPr>
+          <p:nvPr>
+            <p:ph type="title"/>
+          </p:nvPr>
+        </p:nvSpPr>
+        <p:spPr/>
+        <p:txBody>
+          <a:bodyPr/>
+          <a:lstStyle/>
+          <a:p>
+            <a:pPr lvl="0" indent="0" marL="0">
+              <a:buNone/>
+            </a:pPr>
+            <a:r>
+              <a:rPr/>
+              <a:t>Large Language Models on Graphs: A Comprehensive Survey - TKDE, December 2024</a:t>
             </a:r>
           </a:p>
         </p:txBody>
@@ -3375,7 +3495,7 @@
 </p:sld>
 </file>
 
-<file path=ppt/slides/slide4.xml><?xml version="1.0" encoding="utf-8"?>
+<file path=ppt/slides/slide5.xml><?xml version="1.0" encoding="utf-8"?>
 <p:sld xmlns:a="http://schemas.openxmlformats.org/drawingml/2006/main" xmlns:r="http://schemas.openxmlformats.org/officeDocument/2006/relationships" xmlns:p="http://schemas.openxmlformats.org/presentationml/2006/main">
   <p:cSld>
     <p:spTree>

</xml_diff>

<commit_message>
Deploying to gh-pages from @ ManuelePasini/slides-markdown@45831371dcbc56d7f8748be970773c63df287377 🚀
</commit_message>
<xml_diff>
--- a/graph_llm.pptx
+++ b/graph_llm.pptx
@@ -3258,7 +3258,7 @@
             <a:pPr lvl="0"/>
             <a:r>
               <a:rPr/>
-              <a:t>A Survey of Large Language Models for Graphs - KDD 2024</a:t>
+              <a:t>A Survey of Large Language Models for Graphs - KDD, 2024</a:t>
             </a:r>
           </a:p>
           <a:p>
@@ -3272,7 +3272,7 @@
             <a:pPr lvl="0"/>
             <a:r>
               <a:rPr/>
-              <a:t>Think-on-Graph: Deep and Responsible Reasoning of Large Language Model on Knowledge Graph - ICLR 2024</a:t>
+              <a:t>Think-on-Graph: Deep and Responsible Reasoning of Large Language Model on Knowledge Graph - ICLR, 2024</a:t>
             </a:r>
           </a:p>
           <a:p>
@@ -3447,7 +3447,7 @@
             <a:pPr lvl="0"/>
             <a:r>
               <a:rPr b="1"/>
-              <a:t>Input graph into LLM</a:t>
+              <a:t>HOW TO Input graph into LLM</a:t>
             </a:r>
             <a:r>
               <a:rPr/>
@@ -3532,7 +3532,7 @@
             </a:pPr>
             <a:r>
               <a:rPr/>
-              <a:t>Large Language Models on Graphs: A Comprehensive Survey - TDKE, December 2024</a:t>
+              <a:t>Large Language Models on Graphs: A Comprehensive Survey - TKDE, December 2024</a:t>
             </a:r>
           </a:p>
         </p:txBody>

</xml_diff>

<commit_message>
Deploying to gh-pages from @ ManuelePasini/slides-markdown@d21a1d4dbd2fd97925065c371d89c68474188925 🚀
</commit_message>
<xml_diff>
--- a/graph_llm.pptx
+++ b/graph_llm.pptx
@@ -9,7 +9,6 @@
     <p:sldId id="257" r:id="rId3"/>
     <p:sldId id="258" r:id="rId4"/>
     <p:sldId id="259" r:id="rId5"/>
-    <p:sldId id="260" r:id="rId6"/>
   </p:sldIdLst>
   <p:sldSz cx="9144000" cy="5143500" type="screen16x9"/>
   <p:notesSz cx="6858000" cy="9144000"/>
@@ -3355,8 +3354,12 @@
           <a:p>
             <a:pPr lvl="0"/>
             <a:r>
+              <a:rPr b="1"/>
+              <a:t>Three types of graphs</a:t>
+            </a:r>
+            <a:r>
               <a:rPr/>
-              <a:t>Three types of graphs:</a:t>
+              <a:t>:</a:t>
             </a:r>
           </a:p>
           <a:p>
@@ -3378,6 +3381,51 @@
             <a:r>
               <a:rPr/>
               <a:t>Text-Paired Graphs: have textual descriptions defined for the entire graph structure.</a:t>
+            </a:r>
+          </a:p>
+          <a:p>
+            <a:pPr lvl="0"/>
+            <a:r>
+              <a:rPr b="1"/>
+              <a:t>HOW TO Input graph into LLM</a:t>
+            </a:r>
+            <a:r>
+              <a:rPr/>
+              <a:t>:</a:t>
+            </a:r>
+          </a:p>
+          <a:p>
+            <a:pPr lvl="1"/>
+            <a:r>
+              <a:rPr/>
+              <a:t>Plainly verbailizing graph: Verbalizing the graph structure in natural language (e.g., describe edges and adjacency lists)</a:t>
+            </a:r>
+          </a:p>
+          <a:p>
+            <a:pPr lvl="1"/>
+            <a:r>
+              <a:rPr/>
+              <a:t>Paraphrasing graph: paraphrase the graph structure into more natural or concise sentences.</a:t>
+            </a:r>
+          </a:p>
+          <a:p>
+            <a:pPr lvl="2" indent="0">
+              <a:buNone/>
+            </a:pPr>
+            <a:r>
+              <a:rPr>
+                <a:latin typeface="Courier"/>
+              </a:rPr>
+              <a:t>[125] find that
+by prompting LLMs to generate a format explanation of the raw graph inputs for itself (Format-Explanation) or to pretend to play a role in a natural task (Role Prompting), the performance on some problems can be improved but not systematically.
+[130] explores the effect of grounding the pure graph in a real-world scenario, such as social networks, friendship graphs, or co-authorship graphs. In such graphs, nodes are described as people, and edges are relationships between people.</a:t>
+            </a:r>
+          </a:p>
+          <a:p>
+            <a:pPr lvl="1"/>
+            <a:r>
+              <a:rPr/>
+              <a:t> Encoding Graphs Into Implicit Feature Sequences : Usually train a graph encoder to encode the graph structure into a sequence of features and fine-tuning the LLMs to adapt to the new input format.</a:t>
             </a:r>
           </a:p>
         </p:txBody>
@@ -3388,114 +3436,6 @@
 </file>
 
 <file path=ppt/slides/slide4.xml><?xml version="1.0" encoding="utf-8"?>
-<p:sld xmlns:a="http://schemas.openxmlformats.org/drawingml/2006/main" xmlns:r="http://schemas.openxmlformats.org/officeDocument/2006/relationships" xmlns:p="http://schemas.openxmlformats.org/presentationml/2006/main">
-  <p:cSld>
-    <p:spTree>
-      <p:nvGrpSpPr>
-        <p:cNvPr id="1" name=""/>
-        <p:cNvGrpSpPr/>
-        <p:nvPr/>
-      </p:nvGrpSpPr>
-      <p:grpSpPr>
-        <a:xfrm>
-          <a:off x="0" y="0"/>
-          <a:ext cx="0" cy="0"/>
-          <a:chOff x="0" y="0"/>
-          <a:chExt cx="0" cy="0"/>
-        </a:xfrm>
-      </p:grpSpPr>
-      <p:sp>
-        <p:nvSpPr>
-          <p:cNvPr id="2" name="Title 1"/>
-          <p:cNvSpPr>
-            <a:spLocks noGrp="1"/>
-          </p:cNvSpPr>
-          <p:nvPr>
-            <p:ph type="title"/>
-          </p:nvPr>
-        </p:nvSpPr>
-        <p:spPr/>
-        <p:txBody>
-          <a:bodyPr/>
-          <a:lstStyle/>
-          <a:p>
-            <a:pPr lvl="0" indent="0" marL="0">
-              <a:buNone/>
-            </a:pPr>
-            <a:r>
-              <a:rPr/>
-              <a:t>Large Language Models on Graphs: A Comprehensive Survey - TKDE, December 2024</a:t>
-            </a:r>
-          </a:p>
-        </p:txBody>
-      </p:sp>
-      <p:sp>
-        <p:nvSpPr>
-          <p:cNvPr id="3" name="Content Placeholder 2"/>
-          <p:cNvSpPr>
-            <a:spLocks noGrp="1"/>
-          </p:cNvSpPr>
-          <p:nvPr>
-            <p:ph idx="1"/>
-          </p:nvPr>
-        </p:nvSpPr>
-        <p:spPr/>
-        <p:txBody>
-          <a:bodyPr/>
-          <a:lstStyle/>
-          <a:p>
-            <a:pPr lvl="0"/>
-            <a:r>
-              <a:rPr b="1"/>
-              <a:t>HOW TO Input graph into LLM</a:t>
-            </a:r>
-            <a:r>
-              <a:rPr/>
-              <a:t>:</a:t>
-            </a:r>
-          </a:p>
-          <a:p>
-            <a:pPr lvl="1"/>
-            <a:r>
-              <a:rPr/>
-              <a:t>Plainly verbailizing graph: Verbalizing the graph structure in natural language (e.g., describe edges and adjacency lists)</a:t>
-            </a:r>
-          </a:p>
-          <a:p>
-            <a:pPr lvl="1"/>
-            <a:r>
-              <a:rPr/>
-              <a:t>Paraphrasing graph: paraphrase the graph structure into more natural or concise sentences.</a:t>
-            </a:r>
-          </a:p>
-          <a:p>
-            <a:pPr lvl="2" indent="0">
-              <a:buNone/>
-            </a:pPr>
-            <a:r>
-              <a:rPr>
-                <a:latin typeface="Courier"/>
-              </a:rPr>
-              <a:t>[125] find that
-by prompting LLMs to generate a format explanation of the raw graph inputs for itself (Format-Explanation) or to pretend to play a role in a natural task (Role Prompting), the performance on some problems can be improved but not systematically.
-[130] explores the effect of grounding the pure graph in a real-world scenario, such as social networks, friendship graphs, or co-authorship graphs. In such graphs, nodes are described as people, and edges are relationships between people.</a:t>
-            </a:r>
-          </a:p>
-          <a:p>
-            <a:pPr lvl="1"/>
-            <a:r>
-              <a:rPr/>
-              <a:t> Encoding Graphs Into Implicit Feature Sequences : Usually train a graph encoder to encode the graph structure into a sequence of features and fine-tuning the LLMs to adapt to the new input format.</a:t>
-            </a:r>
-          </a:p>
-        </p:txBody>
-      </p:sp>
-    </p:spTree>
-  </p:cSld>
-</p:sld>
-</file>
-
-<file path=ppt/slides/slide5.xml><?xml version="1.0" encoding="utf-8"?>
 <p:sld xmlns:a="http://schemas.openxmlformats.org/drawingml/2006/main" xmlns:r="http://schemas.openxmlformats.org/officeDocument/2006/relationships" xmlns:p="http://schemas.openxmlformats.org/presentationml/2006/main">
   <p:cSld>
     <p:spTree>

</xml_diff>

<commit_message>
Deploying to gh-pages from @ ManuelePasini/slides-markdown@2e9e0cc7226db44939f1deb7e92e1b9803d07384 🚀
</commit_message>
<xml_diff>
--- a/graph_llm.pptx
+++ b/graph_llm.pptx
@@ -9,6 +9,7 @@
     <p:sldId id="257" r:id="rId3"/>
     <p:sldId id="258" r:id="rId4"/>
     <p:sldId id="259" r:id="rId5"/>
+    <p:sldId id="260" r:id="rId6"/>
   </p:sldIdLst>
   <p:sldSz cx="9144000" cy="5143500" type="screen16x9"/>
   <p:notesSz cx="6858000" cy="9144000"/>
@@ -3599,6 +3600,81 @@
             <a:r>
               <a:rPr b="1"/>
               <a:t>Overall, no consensus on how to represent graphs</a:t>
+            </a:r>
+          </a:p>
+        </p:txBody>
+      </p:sp>
+    </p:spTree>
+  </p:cSld>
+</p:sld>
+</file>
+
+<file path=ppt/slides/slide5.xml><?xml version="1.0" encoding="utf-8"?>
+<p:sld xmlns:a="http://schemas.openxmlformats.org/drawingml/2006/main" xmlns:r="http://schemas.openxmlformats.org/officeDocument/2006/relationships" xmlns:p="http://schemas.openxmlformats.org/presentationml/2006/main">
+  <p:cSld>
+    <p:spTree>
+      <p:nvGrpSpPr>
+        <p:cNvPr id="1" name=""/>
+        <p:cNvGrpSpPr/>
+        <p:nvPr/>
+      </p:nvGrpSpPr>
+      <p:grpSpPr>
+        <a:xfrm>
+          <a:off x="0" y="0"/>
+          <a:ext cx="0" cy="0"/>
+          <a:chOff x="0" y="0"/>
+          <a:chExt cx="0" cy="0"/>
+        </a:xfrm>
+      </p:grpSpPr>
+      <p:sp>
+        <p:nvSpPr>
+          <p:cNvPr id="2" name="Title 1"/>
+          <p:cNvSpPr>
+            <a:spLocks noGrp="1"/>
+          </p:cNvSpPr>
+          <p:nvPr>
+            <p:ph type="title"/>
+          </p:nvPr>
+        </p:nvSpPr>
+        <p:spPr/>
+        <p:txBody>
+          <a:bodyPr/>
+          <a:lstStyle/>
+          <a:p>
+            <a:pPr lvl="0" indent="0" marL="0">
+              <a:buNone/>
+            </a:pPr>
+            <a:r>
+              <a:rPr/>
+              <a:t>Large Language Models on Graphs: A Comprehensive Survey - TKDE, December 2024</a:t>
+            </a:r>
+          </a:p>
+        </p:txBody>
+      </p:sp>
+      <p:sp>
+        <p:nvSpPr>
+          <p:cNvPr id="3" name="Content Placeholder 2"/>
+          <p:cNvSpPr>
+            <a:spLocks noGrp="1"/>
+          </p:cNvSpPr>
+          <p:nvPr>
+            <p:ph idx="1"/>
+          </p:nvPr>
+        </p:nvSpPr>
+        <p:spPr/>
+        <p:txBody>
+          <a:bodyPr/>
+          <a:lstStyle/>
+          <a:p>
+            <a:pPr lvl="0" indent="0" marL="0">
+              <a:spcBef>
+                <a:spcPts val="3000"/>
+              </a:spcBef>
+              <a:buNone/>
+            </a:pPr>
+            <a:r>
+              <a:rPr b="1"/>
+              <a:t>Applications - Text-attributed graphs</a:t>
             </a:r>
           </a:p>
         </p:txBody>

</xml_diff>

<commit_message>
Deploying to gh-pages from @ ManuelePasini/slides-markdown@213a3d31d16833594eb89b0d46020d3f8ef37b62 🚀
</commit_message>
<xml_diff>
--- a/graph_llm.pptx
+++ b/graph_llm.pptx
@@ -3675,6 +3675,84 @@
             <a:r>
               <a:rPr b="1"/>
               <a:t>Applications - Text-attributed graphs</a:t>
+            </a:r>
+          </a:p>
+          <a:p>
+            <a:pPr lvl="0"/>
+            <a:r>
+              <a:rPr/>
+              <a:t> LLM as Predictor : language model as the main model architecture to capture both the text information and graph structure information, depending on howstructure information in graphs is injected:</a:t>
+            </a:r>
+          </a:p>
+          <a:p>
+            <a:pPr lvl="1"/>
+            <a:r>
+              <a:rPr/>
+              <a:t> Graph as Sequence : The ego-graphs associated with nodes/edges are serialized into a sequence, depending on how it gets serialized:</a:t>
+            </a:r>
+          </a:p>
+          <a:p>
+            <a:pPr lvl="2"/>
+            <a:r>
+              <a:rPr/>
+              <a:t> Rule-based methods </a:t>
+            </a:r>
+          </a:p>
+          <a:p>
+            <a:pPr lvl="2"/>
+            <a:r>
+              <a:rPr/>
+              <a:t> GNN-based methods: graph encoder models (i.e., GNN) to ego-graph associated with nodes into token representations which are concatenated with the text information</a:t>
+            </a:r>
+          </a:p>
+          <a:p>
+            <a:pPr lvl="1"/>
+            <a:r>
+              <a:rPr/>
+              <a:t> Graph-Empowered LLMs : modify the architecture of Transformersb to encode text and graph structure simultaneously.</a:t>
+            </a:r>
+          </a:p>
+          <a:p>
+            <a:pPr lvl="1"/>
+            <a:r>
+              <a:rPr/>
+              <a:t> Graph-AwareLLM finetuning methods :adopt vanilla language mode and finetune them with structure signals on the graph. </a:t>
+            </a:r>
+            <a:r>
+              <a:rPr b="1"/>
+              <a:t>tons of methods on this</a:t>
+            </a:r>
+          </a:p>
+          <a:p>
+            <a:pPr lvl="0"/>
+            <a:r>
+              <a:rPr b="1"/>
+              <a:t>Takeouts</a:t>
+            </a:r>
+            <a:r>
+              <a:rPr/>
+              <a:t>:</a:t>
+            </a:r>
+          </a:p>
+          <a:p>
+            <a:pPr lvl="1"/>
+            <a:r>
+              <a:rPr/>
+              <a:t>Graph as Code Sequence: Existing graphs as sequence methods are mainly rule-based or GNN-based. Promising way is to obtain a structure-aware sequence for graphs that can support zero-shot inference. e.g., adopt codes (that can capture structures, e.g., graph XML or JSON) to describe the graphs and utilize code LLMs</a:t>
+            </a:r>
+          </a:p>
+          <a:p>
+            <a:pPr lvl="0"/>
+            <a:r>
+              <a:rPr/>
+              <a:t> LLM as Encoder </a:t>
+            </a:r>
+          </a:p>
+          <a:p>
+            <a:pPr lvl="0"/>
+            <a:r>
+              <a:rPr/>
+              <a:t> LLM as Aligner </a:t>
             </a:r>
           </a:p>
         </p:txBody>

</xml_diff>

<commit_message>
Deploying to gh-pages from @ ManuelePasini/slides-markdown@f4f0816c85b15c770c83ec34b6ed05572e9d0444 🚀
</commit_message>
<xml_diff>
--- a/graph_llm.pptx
+++ b/graph_llm.pptx
@@ -10,6 +10,8 @@
     <p:sldId id="258" r:id="rId4"/>
     <p:sldId id="259" r:id="rId5"/>
     <p:sldId id="260" r:id="rId6"/>
+    <p:sldId id="261" r:id="rId7"/>
+    <p:sldId id="262" r:id="rId8"/>
   </p:sldIdLst>
   <p:sldSz cx="9144000" cy="5143500" type="screen16x9"/>
   <p:notesSz cx="6858000" cy="9144000"/>
@@ -3333,7 +3335,7 @@
             </a:pPr>
             <a:r>
               <a:rPr/>
-              <a:t>Large Language Models on Graphs: A Comprehensive Survey - TKDE, December 2024</a:t>
+              <a:t>LLMs on Graphs: A Comprehensive Survey - TKDE, 2024</a:t>
             </a:r>
           </a:p>
         </p:txBody>
@@ -3473,7 +3475,7 @@
             </a:pPr>
             <a:r>
               <a:rPr/>
-              <a:t>Large Language Models on Graphs: A Comprehensive Survey - TKDE, December 2024</a:t>
+              <a:t>LLMs on Graphs: A Comprehensive Survey - TKDE, 2024</a:t>
             </a:r>
           </a:p>
         </p:txBody>
@@ -3646,7 +3648,7 @@
             </a:pPr>
             <a:r>
               <a:rPr/>
-              <a:t>Large Language Models on Graphs: A Comprehensive Survey - TKDE, December 2024</a:t>
+              <a:t>LLMs on Graphs: A Comprehensive Survey - TKDE, 2024</a:t>
             </a:r>
           </a:p>
         </p:txBody>
@@ -3677,6 +3679,69 @@
               <a:t>Applications - Text-attributed graphs</a:t>
             </a:r>
           </a:p>
+        </p:txBody>
+      </p:sp>
+    </p:spTree>
+  </p:cSld>
+</p:sld>
+</file>
+
+<file path=ppt/slides/slide6.xml><?xml version="1.0" encoding="utf-8"?>
+<p:sld xmlns:a="http://schemas.openxmlformats.org/drawingml/2006/main" xmlns:r="http://schemas.openxmlformats.org/officeDocument/2006/relationships" xmlns:p="http://schemas.openxmlformats.org/presentationml/2006/main">
+  <p:cSld>
+    <p:spTree>
+      <p:nvGrpSpPr>
+        <p:cNvPr id="1" name=""/>
+        <p:cNvGrpSpPr/>
+        <p:nvPr/>
+      </p:nvGrpSpPr>
+      <p:grpSpPr>
+        <a:xfrm>
+          <a:off x="0" y="0"/>
+          <a:ext cx="0" cy="0"/>
+          <a:chOff x="0" y="0"/>
+          <a:chExt cx="0" cy="0"/>
+        </a:xfrm>
+      </p:grpSpPr>
+      <p:sp>
+        <p:nvSpPr>
+          <p:cNvPr id="2" name="Title 1"/>
+          <p:cNvSpPr>
+            <a:spLocks noGrp="1"/>
+          </p:cNvSpPr>
+          <p:nvPr>
+            <p:ph type="title"/>
+          </p:nvPr>
+        </p:nvSpPr>
+        <p:spPr/>
+        <p:txBody>
+          <a:bodyPr/>
+          <a:lstStyle/>
+          <a:p>
+            <a:pPr lvl="0" indent="0" marL="0">
+              <a:buNone/>
+            </a:pPr>
+            <a:r>
+              <a:rPr/>
+              <a:t>LLMs on Graphs: A Comprehensive Survey - TKDE, 2024</a:t>
+            </a:r>
+          </a:p>
+        </p:txBody>
+      </p:sp>
+      <p:sp>
+        <p:nvSpPr>
+          <p:cNvPr id="3" name="Content Placeholder 2"/>
+          <p:cNvSpPr>
+            <a:spLocks noGrp="1"/>
+          </p:cNvSpPr>
+          <p:nvPr>
+            <p:ph idx="1"/>
+          </p:nvPr>
+        </p:nvSpPr>
+        <p:spPr/>
+        <p:txBody>
+          <a:bodyPr/>
+          <a:lstStyle/>
           <a:p>
             <a:pPr lvl="0"/>
             <a:r>
@@ -3685,35 +3750,124 @@
             </a:r>
           </a:p>
           <a:p>
+            <a:pPr lvl="0"/>
+            <a:r>
+              <a:rPr/>
+              <a:t> LLM as Encoder </a:t>
+            </a:r>
+          </a:p>
+          <a:p>
+            <a:pPr lvl="0"/>
+            <a:r>
+              <a:rPr/>
+              <a:t> LLM as Aligner </a:t>
+            </a:r>
+          </a:p>
+        </p:txBody>
+      </p:sp>
+    </p:spTree>
+  </p:cSld>
+</p:sld>
+</file>
+
+<file path=ppt/slides/slide7.xml><?xml version="1.0" encoding="utf-8"?>
+<p:sld xmlns:a="http://schemas.openxmlformats.org/drawingml/2006/main" xmlns:r="http://schemas.openxmlformats.org/officeDocument/2006/relationships" xmlns:p="http://schemas.openxmlformats.org/presentationml/2006/main">
+  <p:cSld>
+    <p:spTree>
+      <p:nvGrpSpPr>
+        <p:cNvPr id="1" name=""/>
+        <p:cNvGrpSpPr/>
+        <p:nvPr/>
+      </p:nvGrpSpPr>
+      <p:grpSpPr>
+        <a:xfrm>
+          <a:off x="0" y="0"/>
+          <a:ext cx="0" cy="0"/>
+          <a:chOff x="0" y="0"/>
+          <a:chExt cx="0" cy="0"/>
+        </a:xfrm>
+      </p:grpSpPr>
+      <p:sp>
+        <p:nvSpPr>
+          <p:cNvPr id="2" name="Title 1"/>
+          <p:cNvSpPr>
+            <a:spLocks noGrp="1"/>
+          </p:cNvSpPr>
+          <p:nvPr>
+            <p:ph type="title"/>
+          </p:nvPr>
+        </p:nvSpPr>
+        <p:spPr/>
+        <p:txBody>
+          <a:bodyPr/>
+          <a:lstStyle/>
+          <a:p>
+            <a:pPr lvl="0" indent="0" marL="0">
+              <a:buNone/>
+            </a:pPr>
+            <a:r>
+              <a:rPr/>
+              <a:t>LLMs on Graphs: A Comprehensive Survey - TKDE, 2024</a:t>
+            </a:r>
+          </a:p>
+        </p:txBody>
+      </p:sp>
+      <p:sp>
+        <p:nvSpPr>
+          <p:cNvPr id="3" name="Content Placeholder 2"/>
+          <p:cNvSpPr>
+            <a:spLocks noGrp="1"/>
+          </p:cNvSpPr>
+          <p:nvPr>
+            <p:ph idx="1"/>
+          </p:nvPr>
+        </p:nvSpPr>
+        <p:spPr/>
+        <p:txBody>
+          <a:bodyPr/>
+          <a:lstStyle/>
+          <a:p>
+            <a:pPr lvl="0" indent="0" marL="0">
+              <a:spcBef>
+                <a:spcPts val="3000"/>
+              </a:spcBef>
+              <a:buNone/>
+            </a:pPr>
+            <a:r>
+              <a:rPr b="1"/>
+              <a:t>Applications - Text-attributed graphs - LLM as Predictor</a:t>
+            </a:r>
+          </a:p>
+          <a:p>
+            <a:pPr lvl="0"/>
+            <a:r>
+              <a:rPr/>
+              <a:t> Graph as Sequence : The ego-graphs associated with nodes/edges are serialized into a sequence, depending on how it gets serialized:</a:t>
+            </a:r>
+          </a:p>
+          <a:p>
             <a:pPr lvl="1"/>
             <a:r>
               <a:rPr/>
-              <a:t> Graph as Sequence : The ego-graphs associated with nodes/edges are serialized into a sequence, depending on how it gets serialized:</a:t>
-            </a:r>
-          </a:p>
-          <a:p>
-            <a:pPr lvl="2"/>
-            <a:r>
-              <a:rPr/>
               <a:t> Rule-based methods </a:t>
             </a:r>
           </a:p>
           <a:p>
-            <a:pPr lvl="2"/>
+            <a:pPr lvl="1"/>
             <a:r>
               <a:rPr/>
               <a:t> GNN-based methods: graph encoder models (i.e., GNN) to ego-graph associated with nodes into token representations which are concatenated with the text information</a:t>
             </a:r>
           </a:p>
           <a:p>
-            <a:pPr lvl="1"/>
+            <a:pPr lvl="0"/>
             <a:r>
               <a:rPr/>
               <a:t> Graph-Empowered LLMs : modify the architecture of Transformersb to encode text and graph structure simultaneously.</a:t>
             </a:r>
           </a:p>
           <a:p>
-            <a:pPr lvl="1"/>
+            <a:pPr lvl="0"/>
             <a:r>
               <a:rPr/>
               <a:t> Graph-AwareLLM finetuning methods :adopt vanilla language mode and finetune them with structure signals on the graph. </a:t>
@@ -3735,24 +3889,17 @@
             </a:r>
           </a:p>
           <a:p>
-            <a:pPr lvl="1"/>
-            <a:r>
-              <a:rPr/>
-              <a:t>Graph as Code Sequence: Existing graphs as sequence methods are mainly rule-based or GNN-based. Promising way is to obtain a structure-aware sequence for graphs that can support zero-shot inference. e.g., adopt codes (that can capture structures, e.g., graph XML or JSON) to describe the graphs and utilize code LLMs</a:t>
-            </a:r>
-          </a:p>
-          <a:p>
             <a:pPr lvl="0"/>
             <a:r>
               <a:rPr/>
-              <a:t> LLM as Encoder </a:t>
+              <a:t> Graph as Code Sequence : Existing graphs as sequence methods are mainly rule-based or GNN-based. Promising way is to obtain a structure-aware sequence for graphs that can support zero-shot inference. e.g., adopt codes (that can capture structures, e.g., graph XML or JSON) to describe the graphs and utilize code LLMs</a:t>
             </a:r>
           </a:p>
           <a:p>
             <a:pPr lvl="0"/>
             <a:r>
               <a:rPr/>
-              <a:t> LLM as Aligner </a:t>
+              <a:t> More powerful Graph-Empowered LLms</a:t>
             </a:r>
           </a:p>
         </p:txBody>

</xml_diff>

<commit_message>
Deploying to gh-pages from @ ManuelePasini/slides-markdown@2f6263f754a3d272ff953c46b3f8adfc221c7f11 🚀
</commit_message>
<xml_diff>
--- a/graph_llm.pptx
+++ b/graph_llm.pptx
@@ -11,7 +11,6 @@
     <p:sldId id="259" r:id="rId5"/>
     <p:sldId id="260" r:id="rId6"/>
     <p:sldId id="261" r:id="rId7"/>
-    <p:sldId id="262" r:id="rId8"/>
   </p:sldIdLst>
   <p:sldSz cx="9144000" cy="5143500" type="screen16x9"/>
   <p:notesSz cx="6858000" cy="9144000"/>
@@ -3679,6 +3678,27 @@
               <a:t>Applications - Text-attributed graphs</a:t>
             </a:r>
           </a:p>
+          <a:p>
+            <a:pPr lvl="0"/>
+            <a:r>
+              <a:rPr/>
+              <a:t> LLM as Predictor : language model as the main model architecture to capture both the text information and graph structure information, depending on howstructure information in graphs is injected:</a:t>
+            </a:r>
+          </a:p>
+          <a:p>
+            <a:pPr lvl="0"/>
+            <a:r>
+              <a:rPr/>
+              <a:t> LLM as Encoder </a:t>
+            </a:r>
+          </a:p>
+          <a:p>
+            <a:pPr lvl="0"/>
+            <a:r>
+              <a:rPr/>
+              <a:t> LLM as Aligner </a:t>
+            </a:r>
+          </a:p>
         </p:txBody>
       </p:sp>
     </p:spTree>
@@ -3743,90 +3763,6 @@
           <a:bodyPr/>
           <a:lstStyle/>
           <a:p>
-            <a:pPr lvl="0"/>
-            <a:r>
-              <a:rPr/>
-              <a:t> LLM as Predictor : language model as the main model architecture to capture both the text information and graph structure information, depending on howstructure information in graphs is injected:</a:t>
-            </a:r>
-          </a:p>
-          <a:p>
-            <a:pPr lvl="0"/>
-            <a:r>
-              <a:rPr/>
-              <a:t> LLM as Encoder </a:t>
-            </a:r>
-          </a:p>
-          <a:p>
-            <a:pPr lvl="0"/>
-            <a:r>
-              <a:rPr/>
-              <a:t> LLM as Aligner </a:t>
-            </a:r>
-          </a:p>
-        </p:txBody>
-      </p:sp>
-    </p:spTree>
-  </p:cSld>
-</p:sld>
-</file>
-
-<file path=ppt/slides/slide7.xml><?xml version="1.0" encoding="utf-8"?>
-<p:sld xmlns:a="http://schemas.openxmlformats.org/drawingml/2006/main" xmlns:r="http://schemas.openxmlformats.org/officeDocument/2006/relationships" xmlns:p="http://schemas.openxmlformats.org/presentationml/2006/main">
-  <p:cSld>
-    <p:spTree>
-      <p:nvGrpSpPr>
-        <p:cNvPr id="1" name=""/>
-        <p:cNvGrpSpPr/>
-        <p:nvPr/>
-      </p:nvGrpSpPr>
-      <p:grpSpPr>
-        <a:xfrm>
-          <a:off x="0" y="0"/>
-          <a:ext cx="0" cy="0"/>
-          <a:chOff x="0" y="0"/>
-          <a:chExt cx="0" cy="0"/>
-        </a:xfrm>
-      </p:grpSpPr>
-      <p:sp>
-        <p:nvSpPr>
-          <p:cNvPr id="2" name="Title 1"/>
-          <p:cNvSpPr>
-            <a:spLocks noGrp="1"/>
-          </p:cNvSpPr>
-          <p:nvPr>
-            <p:ph type="title"/>
-          </p:nvPr>
-        </p:nvSpPr>
-        <p:spPr/>
-        <p:txBody>
-          <a:bodyPr/>
-          <a:lstStyle/>
-          <a:p>
-            <a:pPr lvl="0" indent="0" marL="0">
-              <a:buNone/>
-            </a:pPr>
-            <a:r>
-              <a:rPr/>
-              <a:t>LLMs on Graphs: A Comprehensive Survey - TKDE, 2024</a:t>
-            </a:r>
-          </a:p>
-        </p:txBody>
-      </p:sp>
-      <p:sp>
-        <p:nvSpPr>
-          <p:cNvPr id="3" name="Content Placeholder 2"/>
-          <p:cNvSpPr>
-            <a:spLocks noGrp="1"/>
-          </p:cNvSpPr>
-          <p:nvPr>
-            <p:ph idx="1"/>
-          </p:nvPr>
-        </p:nvSpPr>
-        <p:spPr/>
-        <p:txBody>
-          <a:bodyPr/>
-          <a:lstStyle/>
-          <a:p>
             <a:pPr lvl="0" indent="0" marL="0">
               <a:spcBef>
                 <a:spcPts val="3000"/>
@@ -3878,14 +3814,15 @@
             </a:r>
           </a:p>
           <a:p>
-            <a:pPr lvl="0"/>
+            <a:pPr lvl="0" indent="0" marL="0">
+              <a:spcBef>
+                <a:spcPts val="3000"/>
+              </a:spcBef>
+              <a:buNone/>
+            </a:pPr>
             <a:r>
               <a:rPr b="1"/>
-              <a:t>Takeouts</a:t>
-            </a:r>
-            <a:r>
-              <a:rPr/>
-              <a:t>:</a:t>
+              <a:t>Takeouts:</a:t>
             </a:r>
           </a:p>
           <a:p>

</xml_diff>

<commit_message>
Deploying to gh-pages from @ ManuelePasini/slides-markdown@1e3176b5372392e5dea2530852b0419d2792a736 🚀
</commit_message>
<xml_diff>
--- a/graph_llm.pptx
+++ b/graph_llm.pptx
@@ -11,6 +11,8 @@
     <p:sldId id="259" r:id="rId5"/>
     <p:sldId id="260" r:id="rId6"/>
     <p:sldId id="261" r:id="rId7"/>
+    <p:sldId id="262" r:id="rId8"/>
+    <p:sldId id="263" r:id="rId9"/>
   </p:sldIdLst>
   <p:sldSz cx="9144000" cy="5143500" type="screen16x9"/>
   <p:notesSz cx="6858000" cy="9144000"/>
@@ -3273,6 +3275,13 @@
             <a:pPr lvl="0"/>
             <a:r>
               <a:rPr/>
+              <a:t>Large Language Models on Graphs: A Comprehensive Survey - TKDE, 2024</a:t>
+            </a:r>
+          </a:p>
+          <a:p>
+            <a:pPr lvl="0"/>
+            <a:r>
+              <a:rPr/>
               <a:t>Think-on-Graph: Deep and Responsible Reasoning of Large Language Model on Knowledge Graph - ICLR, 2024</a:t>
             </a:r>
           </a:p>
@@ -3682,14 +3691,14 @@
             <a:pPr lvl="0"/>
             <a:r>
               <a:rPr/>
-              <a:t> LLM as Predictor : language model as the main model architecture to capture both the text information and graph structure information, depending on howstructure information in graphs is injected:</a:t>
+              <a:t> LLM as Predictor : LLM as the main model architecture to capture both the text information and graph structure information, depending on how structure information in graphs is injected:</a:t>
             </a:r>
           </a:p>
           <a:p>
             <a:pPr lvl="0"/>
             <a:r>
               <a:rPr/>
-              <a:t> LLM as Encoder </a:t>
+              <a:t> LLM as Encoder : LLMs extract textual features to serve as initial node feature vectors for GNNs, which then generate node/edge representations and make predictions</a:t>
             </a:r>
           </a:p>
           <a:p>
@@ -3837,6 +3846,158 @@
             <a:r>
               <a:rPr/>
               <a:t> More powerful Graph-Empowered LLms</a:t>
+            </a:r>
+          </a:p>
+        </p:txBody>
+      </p:sp>
+    </p:spTree>
+  </p:cSld>
+</p:sld>
+</file>
+
+<file path=ppt/slides/slide7.xml><?xml version="1.0" encoding="utf-8"?>
+<p:sld xmlns:a="http://schemas.openxmlformats.org/drawingml/2006/main" xmlns:r="http://schemas.openxmlformats.org/officeDocument/2006/relationships" xmlns:p="http://schemas.openxmlformats.org/presentationml/2006/main">
+  <p:cSld>
+    <p:spTree>
+      <p:nvGrpSpPr>
+        <p:cNvPr id="1" name=""/>
+        <p:cNvGrpSpPr/>
+        <p:nvPr/>
+      </p:nvGrpSpPr>
+      <p:grpSpPr>
+        <a:xfrm>
+          <a:off x="0" y="0"/>
+          <a:ext cx="0" cy="0"/>
+          <a:chOff x="0" y="0"/>
+          <a:chExt cx="0" cy="0"/>
+        </a:xfrm>
+      </p:grpSpPr>
+      <p:sp>
+        <p:nvSpPr>
+          <p:cNvPr id="2" name="Title 1"/>
+          <p:cNvSpPr>
+            <a:spLocks noGrp="1"/>
+          </p:cNvSpPr>
+          <p:nvPr>
+            <p:ph type="title"/>
+          </p:nvPr>
+        </p:nvSpPr>
+        <p:spPr/>
+        <p:txBody>
+          <a:bodyPr/>
+          <a:lstStyle/>
+          <a:p>
+            <a:pPr lvl="0" indent="0" marL="0">
+              <a:buNone/>
+            </a:pPr>
+            <a:r>
+              <a:rPr/>
+              <a:t>LLMs on Graphs: A Comprehensive Survey - TKDE, 2024</a:t>
+            </a:r>
+          </a:p>
+        </p:txBody>
+      </p:sp>
+      <p:sp>
+        <p:nvSpPr>
+          <p:cNvPr id="3" name="Content Placeholder 2"/>
+          <p:cNvSpPr>
+            <a:spLocks noGrp="1"/>
+          </p:cNvSpPr>
+          <p:nvPr>
+            <p:ph idx="1"/>
+          </p:nvPr>
+        </p:nvSpPr>
+        <p:spPr/>
+        <p:txBody>
+          <a:bodyPr/>
+          <a:lstStyle/>
+          <a:p>
+            <a:pPr lvl="0" indent="0" marL="0">
+              <a:spcBef>
+                <a:spcPts val="3000"/>
+              </a:spcBef>
+              <a:buNone/>
+            </a:pPr>
+            <a:r>
+              <a:rPr b="1"/>
+              <a:t>Applications - Text-attributed graphs - LLM as Encoder</a:t>
+            </a:r>
+          </a:p>
+          <a:p>
+            <a:pPr lvl="0"/>
+            <a:r>
+              <a:rPr/>
+              <a:t>LLMs extract textual features to serve as initial node feature vectors for GNNs, which then generate node/edge representations and make predictions</a:t>
+            </a:r>
+          </a:p>
+        </p:txBody>
+      </p:sp>
+    </p:spTree>
+  </p:cSld>
+</p:sld>
+</file>
+
+<file path=ppt/slides/slide8.xml><?xml version="1.0" encoding="utf-8"?>
+<p:sld xmlns:a="http://schemas.openxmlformats.org/drawingml/2006/main" xmlns:r="http://schemas.openxmlformats.org/officeDocument/2006/relationships" xmlns:p="http://schemas.openxmlformats.org/presentationml/2006/main">
+  <p:cSld>
+    <p:spTree>
+      <p:nvGrpSpPr>
+        <p:cNvPr id="1" name=""/>
+        <p:cNvGrpSpPr/>
+        <p:nvPr/>
+      </p:nvGrpSpPr>
+      <p:grpSpPr>
+        <a:xfrm>
+          <a:off x="0" y="0"/>
+          <a:ext cx="0" cy="0"/>
+          <a:chOff x="0" y="0"/>
+          <a:chExt cx="0" cy="0"/>
+        </a:xfrm>
+      </p:grpSpPr>
+      <p:sp>
+        <p:nvSpPr>
+          <p:cNvPr id="2" name="Title 1"/>
+          <p:cNvSpPr>
+            <a:spLocks noGrp="1"/>
+          </p:cNvSpPr>
+          <p:nvPr>
+            <p:ph type="title"/>
+          </p:nvPr>
+        </p:nvSpPr>
+        <p:spPr/>
+        <p:txBody>
+          <a:bodyPr/>
+          <a:lstStyle/>
+          <a:p>
+            <a:pPr lvl="0" indent="0" marL="0">
+              <a:buNone/>
+            </a:pPr>
+            <a:r>
+              <a:rPr/>
+              <a:t>Moro Takeouts</a:t>
+            </a:r>
+          </a:p>
+        </p:txBody>
+      </p:sp>
+      <p:sp>
+        <p:nvSpPr>
+          <p:cNvPr id="3" name="Content Placeholder 2"/>
+          <p:cNvSpPr>
+            <a:spLocks noGrp="1"/>
+          </p:cNvSpPr>
+          <p:nvPr>
+            <p:ph idx="1"/>
+          </p:nvPr>
+        </p:nvSpPr>
+        <p:spPr/>
+        <p:txBody>
+          <a:bodyPr/>
+          <a:lstStyle/>
+          <a:p>
+            <a:pPr lvl="0"/>
+            <a:r>
+              <a:rPr/>
+              <a:t>Use RAG only if the question lies beyond the typical training data, if the knowledge we’re asking is not embedded in parameters, otherwise performances might get worse</a:t>
             </a:r>
           </a:p>
         </p:txBody>

</xml_diff>

<commit_message>
Deploying to gh-pages from @ ManuelePasini/slides-markdown@8bcada1c2b88a8927ac6f71adf48b7d2edeabace 🚀
</commit_message>
<xml_diff>
--- a/graph_llm.pptx
+++ b/graph_llm.pptx
@@ -13,6 +13,7 @@
     <p:sldId id="261" r:id="rId7"/>
     <p:sldId id="262" r:id="rId8"/>
     <p:sldId id="263" r:id="rId9"/>
+    <p:sldId id="264" r:id="rId10"/>
   </p:sldIdLst>
   <p:sldSz cx="9144000" cy="5143500" type="screen16x9"/>
   <p:notesSz cx="6858000" cy="9144000"/>
@@ -3821,6 +3822,10 @@
               <a:rPr b="1"/>
               <a:t>tons of methods on this</a:t>
             </a:r>
+            <a:r>
+              <a:rPr/>
+              <a:t> :::: {.columns} ::: {.column width=“30%”}</a:t>
+            </a:r>
           </a:p>
           <a:p>
             <a:pPr lvl="0" indent="0" marL="0">
@@ -3838,7 +3843,7 @@
             <a:pPr lvl="0"/>
             <a:r>
               <a:rPr/>
-              <a:t> Graph as Code Sequence : Existing graphs as sequence methods are mainly rule-based or GNN-based. Promising way is to obtain a structure-aware sequence for graphs that can support zero-shot inference. e.g., adopt codes (that can capture structures, e.g., graph XML or JSON) to describe the graphs and utilize code LLMs</a:t>
+              <a:t> Graph as Code Sequence : Graphs as sequence methods are mainly rule-based or GNN-based. Promising way is to obtain a structure-aware sequence e.g., adopt codes (that can capture structures, e.g., graph XML or JSON) for graphs and utilize code LLMs</a:t>
             </a:r>
           </a:p>
           <a:p>
@@ -3846,6 +3851,100 @@
             <a:r>
               <a:rPr/>
               <a:t> More powerful Graph-Empowered LLms</a:t>
+            </a:r>
+          </a:p>
+          <a:p>
+            <a:pPr lvl="0" indent="0" marL="0">
+              <a:buNone/>
+            </a:pPr>
+            <a:r>
+              <a:rPr/>
+              <a:t>::: ::: {.column width=“70%”}</a:t>
+            </a:r>
+          </a:p>
+        </p:txBody>
+      </p:sp>
+      <p:pic>
+        <p:nvPicPr>
+          <p:cNvPr descr="https://github.com/ManuelePasini/slides-markdown/blob/master/slides/images/graphllm/graphpredictor.png.png?raw=true" id="0" name="Picture 1"/>
+          <p:cNvPicPr>
+            <a:picLocks noGrp="1" noChangeAspect="1"/>
+          </p:cNvPicPr>
+          <p:nvPr/>
+        </p:nvPicPr>
+        <p:blipFill>
+          <a:blip r:embed="rId2"/>
+          <a:stretch>
+            <a:fillRect/>
+          </a:stretch>
+        </p:blipFill>
+        <p:spPr bwMode="auto">
+          <a:xfrm>
+            <a:off x="2413000" y="1193800"/>
+            <a:ext cx="4318000" cy="2882900"/>
+          </a:xfrm>
+          <a:prstGeom prst="rect">
+            <a:avLst/>
+          </a:prstGeom>
+          <a:noFill/>
+          <a:ln w="9525">
+            <a:noFill/>
+            <a:headEnd/>
+            <a:tailEnd/>
+          </a:ln>
+        </p:spPr>
+      </p:pic>
+      <p:sp>
+        <p:nvSpPr>
+          <p:cNvPr id="1" name="TextBox 3"/>
+          <p:cNvSpPr txBox="1"/>
+          <p:nvPr/>
+        </p:nvSpPr>
+        <p:spPr>
+          <a:xfrm>
+            <a:off x="457200" y="4076700"/>
+            <a:ext cx="8229600" cy="508000"/>
+          </a:xfrm>
+          <a:prstGeom prst="rect">
+            <a:avLst/>
+          </a:prstGeom>
+          <a:noFill/>
+        </p:spPr>
+        <p:txBody>
+          <a:bodyPr/>
+          <a:lstStyle/>
+          <a:p>
+            <a:pPr lvl="0" indent="0" marL="0" algn="ctr">
+              <a:buNone/>
+            </a:pPr>
+            <a:r>
+              <a:rPr/>
+              <a:t>Schemas for LLM as encoder</a:t>
+            </a:r>
+          </a:p>
+        </p:txBody>
+      </p:sp>
+      <p:sp>
+        <p:nvSpPr>
+          <p:cNvPr id="3" name="Content Placeholder 2"/>
+          <p:cNvSpPr>
+            <a:spLocks noGrp="1"/>
+          </p:cNvSpPr>
+          <p:nvPr>
+            <p:ph idx="1"/>
+          </p:nvPr>
+        </p:nvSpPr>
+        <p:spPr/>
+        <p:txBody>
+          <a:bodyPr/>
+          <a:lstStyle/>
+          <a:p>
+            <a:pPr lvl="0" indent="0" marL="0">
+              <a:buNone/>
+            </a:pPr>
+            <a:r>
+              <a:rPr/>
+              <a:t>::: ::::</a:t>
             </a:r>
           </a:p>
         </p:txBody>
@@ -3930,6 +4029,34 @@
               <a:t>LLMs extract textual features to serve as initial node feature vectors for GNNs, which then generate node/edge representations and make predictions</a:t>
             </a:r>
           </a:p>
+          <a:p>
+            <a:pPr lvl="0"/>
+            <a:r>
+              <a:rPr/>
+              <a:t>Goals:</a:t>
+            </a:r>
+          </a:p>
+          <a:p>
+            <a:pPr lvl="1"/>
+            <a:r>
+              <a:rPr/>
+              <a:t> Optimization : of the GNN output</a:t>
+            </a:r>
+          </a:p>
+          <a:p>
+            <a:pPr lvl="1"/>
+            <a:r>
+              <a:rPr/>
+              <a:t> Data Augmentation: LLMs generate additional text data for theLLM-GNNcascaded architecture.</a:t>
+            </a:r>
+          </a:p>
+          <a:p>
+            <a:pPr lvl="1"/>
+            <a:r>
+              <a:rPr/>
+              <a:t> Knowledge Distillation : Train a GNN+LLM, but using it is costly because of GNN. So we train a “teacher” GNN+LLM model and save embeddings/output, and then a student LLM model leverage those in order to avoid inference costs</a:t>
+            </a:r>
+          </a:p>
         </p:txBody>
       </p:sp>
     </p:spTree>
@@ -3938,6 +4065,129 @@
 </file>
 
 <file path=ppt/slides/slide8.xml><?xml version="1.0" encoding="utf-8"?>
+<p:sld xmlns:a="http://schemas.openxmlformats.org/drawingml/2006/main" xmlns:r="http://schemas.openxmlformats.org/officeDocument/2006/relationships" xmlns:p="http://schemas.openxmlformats.org/presentationml/2006/main">
+  <p:cSld>
+    <p:spTree>
+      <p:nvGrpSpPr>
+        <p:cNvPr id="1" name=""/>
+        <p:cNvGrpSpPr/>
+        <p:nvPr/>
+      </p:nvGrpSpPr>
+      <p:grpSpPr>
+        <a:xfrm>
+          <a:off x="0" y="0"/>
+          <a:ext cx="0" cy="0"/>
+          <a:chOff x="0" y="0"/>
+          <a:chExt cx="0" cy="0"/>
+        </a:xfrm>
+      </p:grpSpPr>
+      <p:sp>
+        <p:nvSpPr>
+          <p:cNvPr id="3" name="Content Placeholder 2"/>
+          <p:cNvSpPr>
+            <a:spLocks noGrp="1"/>
+          </p:cNvSpPr>
+          <p:nvPr>
+            <p:ph idx="1" sz="half"/>
+          </p:nvPr>
+        </p:nvSpPr>
+        <p:spPr/>
+        <p:txBody>
+          <a:bodyPr/>
+          <a:lstStyle/>
+          <a:p>
+            <a:pPr lvl="0"/>
+            <a:r>
+              <a:rPr b="1"/>
+              <a:t>Takeouts</a:t>
+            </a:r>
+            <a:r>
+              <a:rPr/>
+              <a:t>:</a:t>
+            </a:r>
+          </a:p>
+          <a:p>
+            <a:pPr lvl="1"/>
+            <a:r>
+              <a:rPr/>
+              <a:t>LLM is just used for encoding, but not to generate anything</a:t>
+            </a:r>
+          </a:p>
+          <a:p>
+            <a:pPr lvl="1"/>
+            <a:r>
+              <a:rPr/>
+              <a:t>Low efficient knowledge distillation: it looks very promising, but still costly. Potential solution is to distill the model into a much smaller LM or even an MLP</a:t>
+            </a:r>
+          </a:p>
+        </p:txBody>
+      </p:sp>
+      <p:pic>
+        <p:nvPicPr>
+          <p:cNvPr descr="https://github.com/ManuelePasini/slides-markdown/blob/master/slides/images/graphllm/llmencoder.png.png?raw=true" id="0" name="Picture 1"/>
+          <p:cNvPicPr>
+            <a:picLocks noGrp="1" noChangeAspect="1"/>
+          </p:cNvPicPr>
+          <p:nvPr/>
+        </p:nvPicPr>
+        <p:blipFill>
+          <a:blip r:embed="rId2"/>
+          <a:stretch>
+            <a:fillRect/>
+          </a:stretch>
+        </p:blipFill>
+        <p:spPr bwMode="auto">
+          <a:xfrm>
+            <a:off x="4648200" y="1295400"/>
+            <a:ext cx="4038600" cy="2692400"/>
+          </a:xfrm>
+          <a:prstGeom prst="rect">
+            <a:avLst/>
+          </a:prstGeom>
+          <a:noFill/>
+          <a:ln w="9525">
+            <a:noFill/>
+            <a:headEnd/>
+            <a:tailEnd/>
+          </a:ln>
+        </p:spPr>
+      </p:pic>
+      <p:sp>
+        <p:nvSpPr>
+          <p:cNvPr id="1" name="TextBox 3"/>
+          <p:cNvSpPr txBox="1"/>
+          <p:nvPr/>
+        </p:nvSpPr>
+        <p:spPr>
+          <a:xfrm>
+            <a:off x="4648200" y="4076700"/>
+            <a:ext cx="4038600" cy="508000"/>
+          </a:xfrm>
+          <a:prstGeom prst="rect">
+            <a:avLst/>
+          </a:prstGeom>
+          <a:noFill/>
+        </p:spPr>
+        <p:txBody>
+          <a:bodyPr/>
+          <a:lstStyle/>
+          <a:p>
+            <a:pPr lvl="0" indent="0" marL="0" algn="ctr">
+              <a:buNone/>
+            </a:pPr>
+            <a:r>
+              <a:rPr/>
+              <a:t>Schemas for LLM as encoder</a:t>
+            </a:r>
+          </a:p>
+        </p:txBody>
+      </p:sp>
+    </p:spTree>
+  </p:cSld>
+</p:sld>
+</file>
+
+<file path=ppt/slides/slide9.xml><?xml version="1.0" encoding="utf-8"?>
 <p:sld xmlns:a="http://schemas.openxmlformats.org/drawingml/2006/main" xmlns:r="http://schemas.openxmlformats.org/officeDocument/2006/relationships" xmlns:p="http://schemas.openxmlformats.org/presentationml/2006/main">
   <p:cSld>
     <p:spTree>

</xml_diff>

<commit_message>
Deploying to gh-pages from @ ManuelePasini/slides-markdown@1de00e7a3039153af0b92457ce11acb97cf88ebd 🚀
</commit_message>
<xml_diff>
--- a/graph_llm.pptx
+++ b/graph_llm.pptx
@@ -3866,7 +3866,7 @@
       </p:sp>
       <p:pic>
         <p:nvPicPr>
-          <p:cNvPr descr="https://github.com/ManuelePasini/slides-markdown/blob/master/slides/images/graphllm/graphpredictor.png.png?raw=true" id="0" name="Picture 1"/>
+          <p:cNvPr descr="https://github.com/ManuelePasini/slides-markdown/blob/master/slides/images/graphllm/graphpredictor.png?raw=true" id="0" name="Picture 1"/>
           <p:cNvPicPr>
             <a:picLocks noGrp="1" noChangeAspect="1"/>
           </p:cNvPicPr>
@@ -3880,8 +3880,8 @@
         </p:blipFill>
         <p:spPr bwMode="auto">
           <a:xfrm>
-            <a:off x="2413000" y="1193800"/>
-            <a:ext cx="4318000" cy="2882900"/>
+            <a:off x="457200" y="1879600"/>
+            <a:ext cx="8229600" cy="1524000"/>
           </a:xfrm>
           <a:prstGeom prst="rect">
             <a:avLst/>
@@ -4117,14 +4117,14 @@
             <a:pPr lvl="1"/>
             <a:r>
               <a:rPr/>
-              <a:t>Low efficient knowledge distillation: it looks very promising, but still costly. Potential solution is to distill the model into a much smaller LM or even an MLP</a:t>
+              <a:t>Low efficient knowledge distillation: it’s promising, but costly. Potential solution is to distill the model into a smaller LM or even an MLP</a:t>
             </a:r>
           </a:p>
         </p:txBody>
       </p:sp>
       <p:pic>
         <p:nvPicPr>
-          <p:cNvPr descr="https://github.com/ManuelePasini/slides-markdown/blob/master/slides/images/graphllm/llmencoder.png.png?raw=true" id="0" name="Picture 1"/>
+          <p:cNvPr descr="https://github.com/ManuelePasini/slides-markdown/blob/master/slides/images/graphllm/llmencoder.png?raw=true" id="0" name="Picture 1"/>
           <p:cNvPicPr>
             <a:picLocks noGrp="1" noChangeAspect="1"/>
           </p:cNvPicPr>
@@ -4138,8 +4138,8 @@
         </p:blipFill>
         <p:spPr bwMode="auto">
           <a:xfrm>
-            <a:off x="4648200" y="1295400"/>
-            <a:ext cx="4038600" cy="2692400"/>
+            <a:off x="4648200" y="2095500"/>
+            <a:ext cx="4038600" cy="1066800"/>
           </a:xfrm>
           <a:prstGeom prst="rect">
             <a:avLst/>

</xml_diff>

<commit_message>
Deploying to gh-pages from @ ManuelePasini/slides-markdown@b4611c628b119dd75a89296a8e86f96231551319 🚀
</commit_message>
<xml_diff>
--- a/graph_llm.pptx
+++ b/graph_llm.pptx
@@ -14,6 +14,8 @@
     <p:sldId id="262" r:id="rId8"/>
     <p:sldId id="263" r:id="rId9"/>
     <p:sldId id="264" r:id="rId10"/>
+    <p:sldId id="265" r:id="rId11"/>
+    <p:sldId id="266" r:id="rId12"/>
   </p:sldIdLst>
   <p:sldSz cx="9144000" cy="5143500" type="screen16x9"/>
   <p:notesSz cx="6858000" cy="9144000"/>
@@ -3181,6 +3183,172 @@
 </p:sld>
 </file>
 
+<file path=ppt/slides/slide10.xml><?xml version="1.0" encoding="utf-8"?>
+<p:sld xmlns:a="http://schemas.openxmlformats.org/drawingml/2006/main" xmlns:r="http://schemas.openxmlformats.org/officeDocument/2006/relationships" xmlns:p="http://schemas.openxmlformats.org/presentationml/2006/main">
+  <p:cSld>
+    <p:spTree>
+      <p:nvGrpSpPr>
+        <p:cNvPr id="1" name=""/>
+        <p:cNvGrpSpPr/>
+        <p:nvPr/>
+      </p:nvGrpSpPr>
+      <p:grpSpPr>
+        <a:xfrm>
+          <a:off x="0" y="0"/>
+          <a:ext cx="0" cy="0"/>
+          <a:chOff x="0" y="0"/>
+          <a:chExt cx="0" cy="0"/>
+        </a:xfrm>
+      </p:grpSpPr>
+      <p:sp>
+        <p:nvSpPr>
+          <p:cNvPr id="2" name="Title 1"/>
+          <p:cNvSpPr>
+            <a:spLocks noGrp="1"/>
+          </p:cNvSpPr>
+          <p:nvPr>
+            <p:ph type="title"/>
+          </p:nvPr>
+        </p:nvSpPr>
+        <p:spPr/>
+        <p:txBody>
+          <a:bodyPr/>
+          <a:lstStyle/>
+          <a:p>
+            <a:pPr lvl="0" indent="0" marL="0">
+              <a:buNone/>
+            </a:pPr>
+            <a:r>
+              <a:rPr/>
+              <a:t>LLMs on Graphs: A Comprehensive Survey - TKDE, 2024</a:t>
+            </a:r>
+          </a:p>
+        </p:txBody>
+      </p:sp>
+      <p:sp>
+        <p:nvSpPr>
+          <p:cNvPr id="3" name="Content Placeholder 2"/>
+          <p:cNvSpPr>
+            <a:spLocks noGrp="1"/>
+          </p:cNvSpPr>
+          <p:nvPr>
+            <p:ph idx="1"/>
+          </p:nvPr>
+        </p:nvSpPr>
+        <p:spPr/>
+        <p:txBody>
+          <a:bodyPr/>
+          <a:lstStyle/>
+          <a:p>
+            <a:pPr lvl="0" indent="0" marL="0">
+              <a:spcBef>
+                <a:spcPts val="3000"/>
+              </a:spcBef>
+              <a:buNone/>
+            </a:pPr>
+            <a:r>
+              <a:rPr b="1"/>
+              <a:t>Applications - Text-attributed graphs - LLM as Aligner</a:t>
+            </a:r>
+          </a:p>
+          <a:p>
+            <a:pPr lvl="0"/>
+            <a:r>
+              <a:rPr/>
+              <a:t>Two components: LLM for text encoding and GNN for structure encoding. They iteratively interact with each other. According to how they interact:</a:t>
+            </a:r>
+          </a:p>
+          <a:p>
+            <a:pPr lvl="1"/>
+            <a:r>
+              <a:rPr/>
+              <a:t> LLM-GNNPrediction Alignment </a:t>
+            </a:r>
+          </a:p>
+          <a:p>
+            <a:pPr lvl="1"/>
+            <a:r>
+              <a:rPr/>
+              <a:t> LLM-GNN Latent Space Alignmen </a:t>
+            </a:r>
+          </a:p>
+        </p:txBody>
+      </p:sp>
+    </p:spTree>
+  </p:cSld>
+</p:sld>
+</file>
+
+<file path=ppt/slides/slide11.xml><?xml version="1.0" encoding="utf-8"?>
+<p:sld xmlns:a="http://schemas.openxmlformats.org/drawingml/2006/main" xmlns:r="http://schemas.openxmlformats.org/officeDocument/2006/relationships" xmlns:p="http://schemas.openxmlformats.org/presentationml/2006/main">
+  <p:cSld>
+    <p:spTree>
+      <p:nvGrpSpPr>
+        <p:cNvPr id="1" name=""/>
+        <p:cNvGrpSpPr/>
+        <p:nvPr/>
+      </p:nvGrpSpPr>
+      <p:grpSpPr>
+        <a:xfrm>
+          <a:off x="0" y="0"/>
+          <a:ext cx="0" cy="0"/>
+          <a:chOff x="0" y="0"/>
+          <a:chExt cx="0" cy="0"/>
+        </a:xfrm>
+      </p:grpSpPr>
+      <p:sp>
+        <p:nvSpPr>
+          <p:cNvPr id="2" name="Title 1"/>
+          <p:cNvSpPr>
+            <a:spLocks noGrp="1"/>
+          </p:cNvSpPr>
+          <p:nvPr>
+            <p:ph type="title"/>
+          </p:nvPr>
+        </p:nvSpPr>
+        <p:spPr/>
+        <p:txBody>
+          <a:bodyPr/>
+          <a:lstStyle/>
+          <a:p>
+            <a:pPr lvl="0" indent="0" marL="0">
+              <a:buNone/>
+            </a:pPr>
+            <a:r>
+              <a:rPr/>
+              <a:t>Moro Takeouts</a:t>
+            </a:r>
+          </a:p>
+        </p:txBody>
+      </p:sp>
+      <p:sp>
+        <p:nvSpPr>
+          <p:cNvPr id="3" name="Content Placeholder 2"/>
+          <p:cNvSpPr>
+            <a:spLocks noGrp="1"/>
+          </p:cNvSpPr>
+          <p:nvPr>
+            <p:ph idx="1"/>
+          </p:nvPr>
+        </p:nvSpPr>
+        <p:spPr/>
+        <p:txBody>
+          <a:bodyPr/>
+          <a:lstStyle/>
+          <a:p>
+            <a:pPr lvl="0"/>
+            <a:r>
+              <a:rPr/>
+              <a:t>Use RAG only if the question lies beyond the typical training data, if the knowledge we’re asking is not embedded in parameters, otherwise performances might get worse</a:t>
+            </a:r>
+          </a:p>
+        </p:txBody>
+      </p:sp>
+    </p:spTree>
+  </p:cSld>
+</p:sld>
+</file>
+
 <file path=ppt/slides/slide2.xml><?xml version="1.0" encoding="utf-8"?>
 <p:sld xmlns:a="http://schemas.openxmlformats.org/drawingml/2006/main" xmlns:r="http://schemas.openxmlformats.org/officeDocument/2006/relationships" xmlns:p="http://schemas.openxmlformats.org/presentationml/2006/main">
   <p:cSld>
@@ -3822,130 +3990,6 @@
               <a:rPr b="1"/>
               <a:t>tons of methods on this</a:t>
             </a:r>
-            <a:r>
-              <a:rPr/>
-              <a:t> :::: {.columns} ::: {.column width=“30%”}</a:t>
-            </a:r>
-          </a:p>
-          <a:p>
-            <a:pPr lvl="0" indent="0" marL="0">
-              <a:spcBef>
-                <a:spcPts val="3000"/>
-              </a:spcBef>
-              <a:buNone/>
-            </a:pPr>
-            <a:r>
-              <a:rPr b="1"/>
-              <a:t>Takeouts:</a:t>
-            </a:r>
-          </a:p>
-          <a:p>
-            <a:pPr lvl="0"/>
-            <a:r>
-              <a:rPr/>
-              <a:t> Graph as Code Sequence : Graphs as sequence methods are mainly rule-based or GNN-based. Promising way is to obtain a structure-aware sequence e.g., adopt codes (that can capture structures, e.g., graph XML or JSON) for graphs and utilize code LLMs</a:t>
-            </a:r>
-          </a:p>
-          <a:p>
-            <a:pPr lvl="0"/>
-            <a:r>
-              <a:rPr/>
-              <a:t> More powerful Graph-Empowered LLms</a:t>
-            </a:r>
-          </a:p>
-          <a:p>
-            <a:pPr lvl="0" indent="0" marL="0">
-              <a:buNone/>
-            </a:pPr>
-            <a:r>
-              <a:rPr/>
-              <a:t>::: ::: {.column width=“70%”}</a:t>
-            </a:r>
-          </a:p>
-        </p:txBody>
-      </p:sp>
-      <p:pic>
-        <p:nvPicPr>
-          <p:cNvPr descr="https://github.com/ManuelePasini/slides-markdown/blob/master/slides/images/graphllm/graphpredictor.png?raw=true" id="0" name="Picture 1"/>
-          <p:cNvPicPr>
-            <a:picLocks noGrp="1" noChangeAspect="1"/>
-          </p:cNvPicPr>
-          <p:nvPr/>
-        </p:nvPicPr>
-        <p:blipFill>
-          <a:blip r:embed="rId2"/>
-          <a:stretch>
-            <a:fillRect/>
-          </a:stretch>
-        </p:blipFill>
-        <p:spPr bwMode="auto">
-          <a:xfrm>
-            <a:off x="457200" y="1879600"/>
-            <a:ext cx="8229600" cy="1524000"/>
-          </a:xfrm>
-          <a:prstGeom prst="rect">
-            <a:avLst/>
-          </a:prstGeom>
-          <a:noFill/>
-          <a:ln w="9525">
-            <a:noFill/>
-            <a:headEnd/>
-            <a:tailEnd/>
-          </a:ln>
-        </p:spPr>
-      </p:pic>
-      <p:sp>
-        <p:nvSpPr>
-          <p:cNvPr id="1" name="TextBox 3"/>
-          <p:cNvSpPr txBox="1"/>
-          <p:nvPr/>
-        </p:nvSpPr>
-        <p:spPr>
-          <a:xfrm>
-            <a:off x="457200" y="4076700"/>
-            <a:ext cx="8229600" cy="508000"/>
-          </a:xfrm>
-          <a:prstGeom prst="rect">
-            <a:avLst/>
-          </a:prstGeom>
-          <a:noFill/>
-        </p:spPr>
-        <p:txBody>
-          <a:bodyPr/>
-          <a:lstStyle/>
-          <a:p>
-            <a:pPr lvl="0" indent="0" marL="0" algn="ctr">
-              <a:buNone/>
-            </a:pPr>
-            <a:r>
-              <a:rPr/>
-              <a:t>Schemas for LLM as encoder</a:t>
-            </a:r>
-          </a:p>
-        </p:txBody>
-      </p:sp>
-      <p:sp>
-        <p:nvSpPr>
-          <p:cNvPr id="3" name="Content Placeholder 2"/>
-          <p:cNvSpPr>
-            <a:spLocks noGrp="1"/>
-          </p:cNvSpPr>
-          <p:nvPr>
-            <p:ph idx="1"/>
-          </p:nvPr>
-        </p:nvSpPr>
-        <p:spPr/>
-        <p:txBody>
-          <a:bodyPr/>
-          <a:lstStyle/>
-          <a:p>
-            <a:pPr lvl="0" indent="0" marL="0">
-              <a:buNone/>
-            </a:pPr>
-            <a:r>
-              <a:rPr/>
-              <a:t>::: ::::</a:t>
-            </a:r>
           </a:p>
         </p:txBody>
       </p:sp>
@@ -3973,88 +4017,101 @@
       </p:grpSpPr>
       <p:sp>
         <p:nvSpPr>
-          <p:cNvPr id="2" name="Title 1"/>
-          <p:cNvSpPr>
-            <a:spLocks noGrp="1"/>
-          </p:cNvSpPr>
-          <p:nvPr>
-            <p:ph type="title"/>
-          </p:nvPr>
-        </p:nvSpPr>
-        <p:spPr/>
-        <p:txBody>
-          <a:bodyPr/>
-          <a:lstStyle/>
-          <a:p>
-            <a:pPr lvl="0" indent="0" marL="0">
+          <p:cNvPr id="3" name="Content Placeholder 2"/>
+          <p:cNvSpPr>
+            <a:spLocks noGrp="1"/>
+          </p:cNvSpPr>
+          <p:nvPr>
+            <p:ph idx="1" sz="half"/>
+          </p:nvPr>
+        </p:nvSpPr>
+        <p:spPr/>
+        <p:txBody>
+          <a:bodyPr/>
+          <a:lstStyle/>
+          <a:p>
+            <a:pPr lvl="0"/>
+            <a:r>
+              <a:rPr b="1"/>
+              <a:t>Takeouts</a:t>
+            </a:r>
+            <a:r>
+              <a:rPr/>
+              <a:t>:</a:t>
+            </a:r>
+          </a:p>
+          <a:p>
+            <a:pPr lvl="1"/>
+            <a:r>
+              <a:rPr/>
+              <a:t> Graph as Code Sequence : GraphsASequence methods are rule-or GNN-based. Promising way is to obtain a structure-aware sequence that can capture structures (e.g., graph XML or JSON) and utilize code LLMs</a:t>
+            </a:r>
+          </a:p>
+          <a:p>
+            <a:pPr lvl="1"/>
+            <a:r>
+              <a:rPr/>
+              <a:t> More powerful Graph-Empowered LLms</a:t>
+            </a:r>
+          </a:p>
+        </p:txBody>
+      </p:sp>
+      <p:pic>
+        <p:nvPicPr>
+          <p:cNvPr descr="https://github.com/ManuelePasini/slides-markdown/blob/master/slides/images/graphllm/graphpredictor.png?raw=true" id="0" name="Picture 1"/>
+          <p:cNvPicPr>
+            <a:picLocks noGrp="1" noChangeAspect="1"/>
+          </p:cNvPicPr>
+          <p:nvPr/>
+        </p:nvPicPr>
+        <p:blipFill>
+          <a:blip r:embed="rId2"/>
+          <a:stretch>
+            <a:fillRect/>
+          </a:stretch>
+        </p:blipFill>
+        <p:spPr bwMode="auto">
+          <a:xfrm>
+            <a:off x="4648200" y="2260600"/>
+            <a:ext cx="4038600" cy="749300"/>
+          </a:xfrm>
+          <a:prstGeom prst="rect">
+            <a:avLst/>
+          </a:prstGeom>
+          <a:noFill/>
+          <a:ln w="9525">
+            <a:noFill/>
+            <a:headEnd/>
+            <a:tailEnd/>
+          </a:ln>
+        </p:spPr>
+      </p:pic>
+      <p:sp>
+        <p:nvSpPr>
+          <p:cNvPr id="1" name="TextBox 3"/>
+          <p:cNvSpPr txBox="1"/>
+          <p:nvPr/>
+        </p:nvSpPr>
+        <p:spPr>
+          <a:xfrm>
+            <a:off x="4648200" y="4076700"/>
+            <a:ext cx="4038600" cy="508000"/>
+          </a:xfrm>
+          <a:prstGeom prst="rect">
+            <a:avLst/>
+          </a:prstGeom>
+          <a:noFill/>
+        </p:spPr>
+        <p:txBody>
+          <a:bodyPr/>
+          <a:lstStyle/>
+          <a:p>
+            <a:pPr lvl="0" indent="0" marL="0" algn="ctr">
               <a:buNone/>
             </a:pPr>
             <a:r>
               <a:rPr/>
-              <a:t>LLMs on Graphs: A Comprehensive Survey - TKDE, 2024</a:t>
-            </a:r>
-          </a:p>
-        </p:txBody>
-      </p:sp>
-      <p:sp>
-        <p:nvSpPr>
-          <p:cNvPr id="3" name="Content Placeholder 2"/>
-          <p:cNvSpPr>
-            <a:spLocks noGrp="1"/>
-          </p:cNvSpPr>
-          <p:nvPr>
-            <p:ph idx="1"/>
-          </p:nvPr>
-        </p:nvSpPr>
-        <p:spPr/>
-        <p:txBody>
-          <a:bodyPr/>
-          <a:lstStyle/>
-          <a:p>
-            <a:pPr lvl="0" indent="0" marL="0">
-              <a:spcBef>
-                <a:spcPts val="3000"/>
-              </a:spcBef>
-              <a:buNone/>
-            </a:pPr>
-            <a:r>
-              <a:rPr b="1"/>
-              <a:t>Applications - Text-attributed graphs - LLM as Encoder</a:t>
-            </a:r>
-          </a:p>
-          <a:p>
-            <a:pPr lvl="0"/>
-            <a:r>
-              <a:rPr/>
-              <a:t>LLMs extract textual features to serve as initial node feature vectors for GNNs, which then generate node/edge representations and make predictions</a:t>
-            </a:r>
-          </a:p>
-          <a:p>
-            <a:pPr lvl="0"/>
-            <a:r>
-              <a:rPr/>
-              <a:t>Goals:</a:t>
-            </a:r>
-          </a:p>
-          <a:p>
-            <a:pPr lvl="1"/>
-            <a:r>
-              <a:rPr/>
-              <a:t> Optimization : of the GNN output</a:t>
-            </a:r>
-          </a:p>
-          <a:p>
-            <a:pPr lvl="1"/>
-            <a:r>
-              <a:rPr/>
-              <a:t> Data Augmentation: LLMs generate additional text data for theLLM-GNNcascaded architecture.</a:t>
-            </a:r>
-          </a:p>
-          <a:p>
-            <a:pPr lvl="1"/>
-            <a:r>
-              <a:rPr/>
-              <a:t> Knowledge Distillation : Train a GNN+LLM, but using it is costly because of GNN. So we train a “teacher” GNN+LLM model and save embeddings/output, and then a student LLM model leverage those in order to avoid inference costs</a:t>
+              <a:t>Schemas for LLM as encoder</a:t>
             </a:r>
           </a:p>
         </p:txBody>
@@ -4065,6 +4122,116 @@
 </file>
 
 <file path=ppt/slides/slide8.xml><?xml version="1.0" encoding="utf-8"?>
+<p:sld xmlns:a="http://schemas.openxmlformats.org/drawingml/2006/main" xmlns:r="http://schemas.openxmlformats.org/officeDocument/2006/relationships" xmlns:p="http://schemas.openxmlformats.org/presentationml/2006/main">
+  <p:cSld>
+    <p:spTree>
+      <p:nvGrpSpPr>
+        <p:cNvPr id="1" name=""/>
+        <p:cNvGrpSpPr/>
+        <p:nvPr/>
+      </p:nvGrpSpPr>
+      <p:grpSpPr>
+        <a:xfrm>
+          <a:off x="0" y="0"/>
+          <a:ext cx="0" cy="0"/>
+          <a:chOff x="0" y="0"/>
+          <a:chExt cx="0" cy="0"/>
+        </a:xfrm>
+      </p:grpSpPr>
+      <p:sp>
+        <p:nvSpPr>
+          <p:cNvPr id="2" name="Title 1"/>
+          <p:cNvSpPr>
+            <a:spLocks noGrp="1"/>
+          </p:cNvSpPr>
+          <p:nvPr>
+            <p:ph type="title"/>
+          </p:nvPr>
+        </p:nvSpPr>
+        <p:spPr/>
+        <p:txBody>
+          <a:bodyPr/>
+          <a:lstStyle/>
+          <a:p>
+            <a:pPr lvl="0" indent="0" marL="0">
+              <a:buNone/>
+            </a:pPr>
+            <a:r>
+              <a:rPr/>
+              <a:t>LLMs on Graphs: A Comprehensive Survey - TKDE, 2024</a:t>
+            </a:r>
+          </a:p>
+        </p:txBody>
+      </p:sp>
+      <p:sp>
+        <p:nvSpPr>
+          <p:cNvPr id="3" name="Content Placeholder 2"/>
+          <p:cNvSpPr>
+            <a:spLocks noGrp="1"/>
+          </p:cNvSpPr>
+          <p:nvPr>
+            <p:ph idx="1"/>
+          </p:nvPr>
+        </p:nvSpPr>
+        <p:spPr/>
+        <p:txBody>
+          <a:bodyPr/>
+          <a:lstStyle/>
+          <a:p>
+            <a:pPr lvl="0" indent="0" marL="0">
+              <a:spcBef>
+                <a:spcPts val="3000"/>
+              </a:spcBef>
+              <a:buNone/>
+            </a:pPr>
+            <a:r>
+              <a:rPr b="1"/>
+              <a:t>Applications - Text-attributed graphs - LLM as Encoder</a:t>
+            </a:r>
+          </a:p>
+          <a:p>
+            <a:pPr lvl="0"/>
+            <a:r>
+              <a:rPr/>
+              <a:t>LLMs extract textual features to serve as initial node feature vectors for GNNs, which then generate node/edge representations and make predictions</a:t>
+            </a:r>
+          </a:p>
+          <a:p>
+            <a:pPr lvl="0"/>
+            <a:r>
+              <a:rPr/>
+              <a:t>Goals:</a:t>
+            </a:r>
+          </a:p>
+          <a:p>
+            <a:pPr lvl="1"/>
+            <a:r>
+              <a:rPr/>
+              <a:t> Optimization : of the GNN output</a:t>
+            </a:r>
+          </a:p>
+          <a:p>
+            <a:pPr lvl="1"/>
+            <a:r>
+              <a:rPr/>
+              <a:t> Data Augmentation: LLMs generate additional text data for theLLM-GNNcascaded architecture.</a:t>
+            </a:r>
+          </a:p>
+          <a:p>
+            <a:pPr lvl="1"/>
+            <a:r>
+              <a:rPr/>
+              <a:t> Knowledge Distillation : Train a GNN+LLM, but using it is costly because of GNN. So we train a “teacher” GNN+LLM model and save embeddings/output, and then a student LLM model leverage those in order to avoid inference costs</a:t>
+            </a:r>
+          </a:p>
+        </p:txBody>
+      </p:sp>
+    </p:spTree>
+  </p:cSld>
+</p:sld>
+</file>
+
+<file path=ppt/slides/slide9.xml><?xml version="1.0" encoding="utf-8"?>
 <p:sld xmlns:a="http://schemas.openxmlformats.org/drawingml/2006/main" xmlns:r="http://schemas.openxmlformats.org/officeDocument/2006/relationships" xmlns:p="http://schemas.openxmlformats.org/presentationml/2006/main">
   <p:cSld>
     <p:spTree>
@@ -4178,76 +4345,6 @@
             <a:r>
               <a:rPr/>
               <a:t>Schemas for LLM as encoder</a:t>
-            </a:r>
-          </a:p>
-        </p:txBody>
-      </p:sp>
-    </p:spTree>
-  </p:cSld>
-</p:sld>
-</file>
-
-<file path=ppt/slides/slide9.xml><?xml version="1.0" encoding="utf-8"?>
-<p:sld xmlns:a="http://schemas.openxmlformats.org/drawingml/2006/main" xmlns:r="http://schemas.openxmlformats.org/officeDocument/2006/relationships" xmlns:p="http://schemas.openxmlformats.org/presentationml/2006/main">
-  <p:cSld>
-    <p:spTree>
-      <p:nvGrpSpPr>
-        <p:cNvPr id="1" name=""/>
-        <p:cNvGrpSpPr/>
-        <p:nvPr/>
-      </p:nvGrpSpPr>
-      <p:grpSpPr>
-        <a:xfrm>
-          <a:off x="0" y="0"/>
-          <a:ext cx="0" cy="0"/>
-          <a:chOff x="0" y="0"/>
-          <a:chExt cx="0" cy="0"/>
-        </a:xfrm>
-      </p:grpSpPr>
-      <p:sp>
-        <p:nvSpPr>
-          <p:cNvPr id="2" name="Title 1"/>
-          <p:cNvSpPr>
-            <a:spLocks noGrp="1"/>
-          </p:cNvSpPr>
-          <p:nvPr>
-            <p:ph type="title"/>
-          </p:nvPr>
-        </p:nvSpPr>
-        <p:spPr/>
-        <p:txBody>
-          <a:bodyPr/>
-          <a:lstStyle/>
-          <a:p>
-            <a:pPr lvl="0" indent="0" marL="0">
-              <a:buNone/>
-            </a:pPr>
-            <a:r>
-              <a:rPr/>
-              <a:t>Moro Takeouts</a:t>
-            </a:r>
-          </a:p>
-        </p:txBody>
-      </p:sp>
-      <p:sp>
-        <p:nvSpPr>
-          <p:cNvPr id="3" name="Content Placeholder 2"/>
-          <p:cNvSpPr>
-            <a:spLocks noGrp="1"/>
-          </p:cNvSpPr>
-          <p:nvPr>
-            <p:ph idx="1"/>
-          </p:nvPr>
-        </p:nvSpPr>
-        <p:spPr/>
-        <p:txBody>
-          <a:bodyPr/>
-          <a:lstStyle/>
-          <a:p>
-            <a:pPr lvl="0"/>
-            <a:r>
-              <a:rPr/>
-              <a:t>Use RAG only if the question lies beyond the typical training data, if the knowledge we’re asking is not embedded in parameters, otherwise performances might get worse</a:t>
             </a:r>
           </a:p>
         </p:txBody>

</xml_diff>

<commit_message>
Deploying to gh-pages from @ ManuelePasini/slides-markdown@3a4b914f64571c51ff1b78407778970ca94e8d57 🚀
</commit_message>
<xml_diff>
--- a/graph_llm.pptx
+++ b/graph_llm.pptx
@@ -16,6 +16,8 @@
     <p:sldId id="264" r:id="rId10"/>
     <p:sldId id="265" r:id="rId11"/>
     <p:sldId id="266" r:id="rId12"/>
+    <p:sldId id="267" r:id="rId13"/>
+    <p:sldId id="268" r:id="rId14"/>
   </p:sldIdLst>
   <p:sldSz cx="9144000" cy="5143500" type="screen16x9"/>
   <p:notesSz cx="6858000" cy="9144000"/>
@@ -3262,14 +3264,14 @@
             <a:pPr lvl="1"/>
             <a:r>
               <a:rPr/>
-              <a:t> LLM-GNNPrediction Alignment </a:t>
+              <a:t> LLM-GNN Prediction Alignment : Iteratively train LLM with graph text data, train GNN with graph structure data. LLM generates labels for nodes from the text perspective and serve them as pseudo-labels for GNN training; GNN generates labels for nodes from the structure perspective and serve them as pseudo-labels for LLM training.</a:t>
             </a:r>
           </a:p>
           <a:p>
             <a:pPr lvl="1"/>
             <a:r>
               <a:rPr/>
-              <a:t> LLM-GNN Latent Space Alignmen </a:t>
+              <a:t> LLM-GNN Latent Space Alignment : connecting text encoding (LLM) and structure encoding (GNN) with cross-modality contrastive learning. The integration between the two models happens in the latent space, similar text encoding and structure encoding will be close in the latent space</a:t>
             </a:r>
           </a:p>
         </p:txBody>
@@ -3298,6 +3300,129 @@
       </p:grpSpPr>
       <p:sp>
         <p:nvSpPr>
+          <p:cNvPr id="3" name="Content Placeholder 2"/>
+          <p:cNvSpPr>
+            <a:spLocks noGrp="1"/>
+          </p:cNvSpPr>
+          <p:nvPr>
+            <p:ph idx="1" sz="half"/>
+          </p:nvPr>
+        </p:nvSpPr>
+        <p:spPr/>
+        <p:txBody>
+          <a:bodyPr/>
+          <a:lstStyle/>
+          <a:p>
+            <a:pPr lvl="0"/>
+            <a:r>
+              <a:rPr b="1"/>
+              <a:t>Takeouts</a:t>
+            </a:r>
+            <a:r>
+              <a:rPr/>
+              <a:t>:</a:t>
+            </a:r>
+          </a:p>
+          <a:p>
+            <a:pPr lvl="1"/>
+            <a:r>
+              <a:rPr/>
+              <a:t>Heterogeneous semantic relations: the semantic relationships between data units can be multiplex. Different relations have different distributions and a single semantic alignment will fail to capture the comprehensively. Risks of flatting the semantics of data</a:t>
+            </a:r>
+          </a:p>
+          <a:p>
+            <a:pPr lvl="1"/>
+            <a:r>
+              <a:rPr/>
+              <a:t>Low efficient knowledge distillation: it’s promising, but costly. Potential solution is to distill the model into a smaller LM or even an MLP</a:t>
+            </a:r>
+          </a:p>
+        </p:txBody>
+      </p:sp>
+      <p:pic>
+        <p:nvPicPr>
+          <p:cNvPr descr="https://github.com/ManuelePasini/slides-markdown/blob/master/slides/images/graphllm/llmaligner.png?raw=true" id="0" name="Picture 1"/>
+          <p:cNvPicPr>
+            <a:picLocks noGrp="1" noChangeAspect="1"/>
+          </p:cNvPicPr>
+          <p:nvPr/>
+        </p:nvPicPr>
+        <p:blipFill>
+          <a:blip r:embed="rId2"/>
+          <a:stretch>
+            <a:fillRect/>
+          </a:stretch>
+        </p:blipFill>
+        <p:spPr bwMode="auto">
+          <a:xfrm>
+            <a:off x="4648200" y="1981200"/>
+            <a:ext cx="4038600" cy="1295400"/>
+          </a:xfrm>
+          <a:prstGeom prst="rect">
+            <a:avLst/>
+          </a:prstGeom>
+          <a:noFill/>
+          <a:ln w="9525">
+            <a:noFill/>
+            <a:headEnd/>
+            <a:tailEnd/>
+          </a:ln>
+        </p:spPr>
+      </p:pic>
+      <p:sp>
+        <p:nvSpPr>
+          <p:cNvPr id="1" name="TextBox 3"/>
+          <p:cNvSpPr txBox="1"/>
+          <p:nvPr/>
+        </p:nvSpPr>
+        <p:spPr>
+          <a:xfrm>
+            <a:off x="4648200" y="4076700"/>
+            <a:ext cx="4038600" cy="508000"/>
+          </a:xfrm>
+          <a:prstGeom prst="rect">
+            <a:avLst/>
+          </a:prstGeom>
+          <a:noFill/>
+        </p:spPr>
+        <p:txBody>
+          <a:bodyPr/>
+          <a:lstStyle/>
+          <a:p>
+            <a:pPr lvl="0" indent="0" marL="0" algn="ctr">
+              <a:buNone/>
+            </a:pPr>
+            <a:r>
+              <a:rPr/>
+              <a:t>Schemas for LLM as Aligner</a:t>
+            </a:r>
+          </a:p>
+        </p:txBody>
+      </p:sp>
+    </p:spTree>
+  </p:cSld>
+</p:sld>
+</file>
+
+<file path=ppt/slides/slide12.xml><?xml version="1.0" encoding="utf-8"?>
+<p:sld xmlns:a="http://schemas.openxmlformats.org/drawingml/2006/main" xmlns:r="http://schemas.openxmlformats.org/officeDocument/2006/relationships" xmlns:p="http://schemas.openxmlformats.org/presentationml/2006/main">
+  <p:cSld>
+    <p:spTree>
+      <p:nvGrpSpPr>
+        <p:cNvPr id="1" name=""/>
+        <p:cNvGrpSpPr/>
+        <p:nvPr/>
+      </p:nvGrpSpPr>
+      <p:grpSpPr>
+        <a:xfrm>
+          <a:off x="0" y="0"/>
+          <a:ext cx="0" cy="0"/>
+          <a:chOff x="0" y="0"/>
+          <a:chExt cx="0" cy="0"/>
+        </a:xfrm>
+      </p:grpSpPr>
+      <p:sp>
+        <p:nvSpPr>
           <p:cNvPr id="2" name="Title 1"/>
           <p:cNvSpPr>
             <a:spLocks noGrp="1"/>
@@ -3340,6 +3465,81 @@
             <a:r>
               <a:rPr/>
               <a:t>Use RAG only if the question lies beyond the typical training data, if the knowledge we’re asking is not embedded in parameters, otherwise performances might get worse</a:t>
+            </a:r>
+          </a:p>
+        </p:txBody>
+      </p:sp>
+    </p:spTree>
+  </p:cSld>
+</p:sld>
+</file>
+
+<file path=ppt/slides/slide13.xml><?xml version="1.0" encoding="utf-8"?>
+<p:sld xmlns:a="http://schemas.openxmlformats.org/drawingml/2006/main" xmlns:r="http://schemas.openxmlformats.org/officeDocument/2006/relationships" xmlns:p="http://schemas.openxmlformats.org/presentationml/2006/main">
+  <p:cSld>
+    <p:spTree>
+      <p:nvGrpSpPr>
+        <p:cNvPr id="1" name=""/>
+        <p:cNvGrpSpPr/>
+        <p:nvPr/>
+      </p:nvGrpSpPr>
+      <p:grpSpPr>
+        <a:xfrm>
+          <a:off x="0" y="0"/>
+          <a:ext cx="0" cy="0"/>
+          <a:chOff x="0" y="0"/>
+          <a:chExt cx="0" cy="0"/>
+        </a:xfrm>
+      </p:grpSpPr>
+      <p:sp>
+        <p:nvSpPr>
+          <p:cNvPr id="2" name="Title 1"/>
+          <p:cNvSpPr>
+            <a:spLocks noGrp="1"/>
+          </p:cNvSpPr>
+          <p:nvPr>
+            <p:ph type="title"/>
+          </p:nvPr>
+        </p:nvSpPr>
+        <p:spPr/>
+        <p:txBody>
+          <a:bodyPr/>
+          <a:lstStyle/>
+          <a:p>
+            <a:pPr lvl="0" indent="0" marL="0">
+              <a:buNone/>
+            </a:pPr>
+            <a:r>
+              <a:rPr/>
+              <a:t>LLMs on Graphs: A Comprehensive Survey - TKDE, 2024</a:t>
+            </a:r>
+          </a:p>
+        </p:txBody>
+      </p:sp>
+      <p:sp>
+        <p:nvSpPr>
+          <p:cNvPr id="3" name="Content Placeholder 2"/>
+          <p:cNvSpPr>
+            <a:spLocks noGrp="1"/>
+          </p:cNvSpPr>
+          <p:nvPr>
+            <p:ph idx="1"/>
+          </p:nvPr>
+        </p:nvSpPr>
+        <p:spPr/>
+        <p:txBody>
+          <a:bodyPr/>
+          <a:lstStyle/>
+          <a:p>
+            <a:pPr lvl="0" indent="0" marL="0">
+              <a:spcBef>
+                <a:spcPts val="3000"/>
+              </a:spcBef>
+              <a:buNone/>
+            </a:pPr>
+            <a:r>
+              <a:rPr b="1"/>
+              <a:t>Applications - Text-Paired graphs - LLM as Aligner</a:t>
             </a:r>
           </a:p>
         </p:txBody>
@@ -4044,7 +4244,7 @@
             <a:pPr lvl="1"/>
             <a:r>
               <a:rPr/>
-              <a:t> Graph as Code Sequence : GraphsASequence methods are rule-or GNN-based. Promising way is to obtain a structure-aware sequence that can capture structures (e.g., graph XML or JSON) and utilize code LLMs</a:t>
+              <a:t> Graph as Code Sequence : GraphsASequence are rule-or GNN-based. Another way is to obtain a structure-aware sequence that can capture structures (e.g., graph XML or JSON) and utilize code LLMs.</a:t>
             </a:r>
           </a:p>
           <a:p>

</xml_diff>

<commit_message>
Deploying to gh-pages from @ ManuelePasini/slides-markdown@6512416f3d4e0ae5c4868c372ea8c460878d3100 🚀
</commit_message>
<xml_diff>
--- a/graph_llm.pptx
+++ b/graph_llm.pptx
@@ -3540,6 +3540,66 @@
             <a:r>
               <a:rPr b="1"/>
               <a:t>Applications - Text-Paired graphs - LLM as Aligner</a:t>
+            </a:r>
+          </a:p>
+        </p:txBody>
+      </p:sp>
+      <p:pic>
+        <p:nvPicPr>
+          <p:cNvPr descr="https://github.com/ManuelePasini/slides-markdown/blob/master/slides/images/graphllm/taxonomy.png?raw=true" id="0" name="Picture 1"/>
+          <p:cNvPicPr>
+            <a:picLocks noGrp="1" noChangeAspect="1"/>
+          </p:cNvPicPr>
+          <p:nvPr/>
+        </p:nvPicPr>
+        <p:blipFill>
+          <a:blip r:embed="rId2"/>
+          <a:stretch>
+            <a:fillRect/>
+          </a:stretch>
+        </p:blipFill>
+        <p:spPr bwMode="auto">
+          <a:xfrm>
+            <a:off x="2692400" y="1193800"/>
+            <a:ext cx="3759200" cy="2882900"/>
+          </a:xfrm>
+          <a:prstGeom prst="rect">
+            <a:avLst/>
+          </a:prstGeom>
+          <a:noFill/>
+          <a:ln w="9525">
+            <a:noFill/>
+            <a:headEnd/>
+            <a:tailEnd/>
+          </a:ln>
+        </p:spPr>
+      </p:pic>
+      <p:sp>
+        <p:nvSpPr>
+          <p:cNvPr id="1" name="TextBox 3"/>
+          <p:cNvSpPr txBox="1"/>
+          <p:nvPr/>
+        </p:nvSpPr>
+        <p:spPr>
+          <a:xfrm>
+            <a:off x="457200" y="4076700"/>
+            <a:ext cx="8229600" cy="508000"/>
+          </a:xfrm>
+          <a:prstGeom prst="rect">
+            <a:avLst/>
+          </a:prstGeom>
+          <a:noFill/>
+        </p:spPr>
+        <p:txBody>
+          <a:bodyPr/>
+          <a:lstStyle/>
+          <a:p>
+            <a:pPr lvl="0" indent="0" marL="0" algn="ctr">
+              <a:buNone/>
+            </a:pPr>
+            <a:r>
+              <a:rPr/>
+              <a:t>Taxonomy of graph + llm contributions in literature</a:t>
             </a:r>
           </a:p>
         </p:txBody>

</xml_diff>

<commit_message>
Deploying to gh-pages from @ ManuelePasini/slides-markdown@8fea2c1908f182aac613a208ccf3c67d7545b979 🚀
</commit_message>
<xml_diff>
--- a/graph_llm.pptx
+++ b/graph_llm.pptx
@@ -18,6 +18,7 @@
     <p:sldId id="266" r:id="rId12"/>
     <p:sldId id="267" r:id="rId13"/>
     <p:sldId id="268" r:id="rId14"/>
+    <p:sldId id="269" r:id="rId15"/>
   </p:sldIdLst>
   <p:sldSz cx="9144000" cy="5143500" type="screen16x9"/>
   <p:notesSz cx="6858000" cy="9144000"/>
@@ -3441,7 +3442,7 @@
             </a:pPr>
             <a:r>
               <a:rPr/>
-              <a:t>Moro Takeouts</a:t>
+              <a:t>Applications</a:t>
             </a:r>
           </a:p>
         </p:txBody>
@@ -3464,7 +3465,63 @@
             <a:pPr lvl="0"/>
             <a:r>
               <a:rPr/>
-              <a:t>Use RAG only if the question lies beyond the typical training data, if the knowledge we’re asking is not embedded in parameters, otherwise performances might get worse</a:t>
+              <a:t>GraphText: Graph reasoning in text space - NIPS 2025:</a:t>
+            </a:r>
+          </a:p>
+          <a:p>
+            <a:pPr lvl="1"/>
+            <a:r>
+              <a:rPr/>
+              <a:t>GraphText translates graphs to natural language. GRAPHTEXT derives a graph-syntax tree for each graph that encapsulates both the node attributes and inter-node relationships. Traversal of the tree yields a graph text sequence, which is then processed by an LLM to treat graph tasks as text generation tasks. Notably, GRAPHTEXT offers multiple advantages. It introduces training-free graph reasoning: even without training on graph data, GRAPHTEXT with ChatGPT can achieve on par with, or even surpassing, the performance of supervised-trained graph neural networks through in-context learning (ICL). Furthermore, GRAPHTEXT paves the way for interactive graph reasoning, allowing both humans and LLMs to communicate with the model seamlessly using natural language.</a:t>
+            </a:r>
+          </a:p>
+          <a:p>
+            <a:pPr lvl="0"/>
+            <a:r>
+              <a:rPr/>
+              <a:t>Temporal Knowledge Graph Forecasting: predicting future facts occur at time tn based on given historical facts occur at time t with t &lt; tn</a:t>
+            </a:r>
+          </a:p>
+          <a:p>
+            <a:pPr lvl="0"/>
+            <a:r>
+              <a:rPr/>
+              <a:t>Knowledge base question answering:</a:t>
+            </a:r>
+          </a:p>
+          <a:p>
+            <a:pPr lvl="1"/>
+            <a:r>
+              <a:rPr/>
+              <a:t>FlexKQBA: given a KG, create new data to train QA algorithms: given a query, parse them in natural language</a:t>
+            </a:r>
+          </a:p>
+          <a:p>
+            <a:pPr lvl="1"/>
+            <a:r>
+              <a:rPr/>
+              <a:t>Knowledge Graph Question Generation (KGQG): generate questions based on graph.</a:t>
+            </a:r>
+          </a:p>
+          <a:p>
+            <a:pPr lvl="0"/>
+            <a:r>
+              <a:rPr/>
+              <a:t>Knowledge graph completion:</a:t>
+            </a:r>
+          </a:p>
+          <a:p>
+            <a:pPr lvl="0"/>
+            <a:r>
+              <a:rPr/>
+              <a:t>Class-Imbalanced Graph Learning: imbalance not only in labels (e.g. more fraud users than legit in a social network graph), but also in graph connectivity (more :marriedTo than :friendOf).</a:t>
+            </a:r>
+          </a:p>
+          <a:p>
+            <a:pPr lvl="1"/>
+            <a:r>
+              <a:rPr/>
+              <a:t>LLM used to generate synthetic data to represent the unbalanced class;</a:t>
             </a:r>
           </a:p>
         </p:txBody>
@@ -3475,6 +3532,76 @@
 </file>
 
 <file path=ppt/slides/slide13.xml><?xml version="1.0" encoding="utf-8"?>
+<p:sld xmlns:a="http://schemas.openxmlformats.org/drawingml/2006/main" xmlns:r="http://schemas.openxmlformats.org/officeDocument/2006/relationships" xmlns:p="http://schemas.openxmlformats.org/presentationml/2006/main">
+  <p:cSld>
+    <p:spTree>
+      <p:nvGrpSpPr>
+        <p:cNvPr id="1" name=""/>
+        <p:cNvGrpSpPr/>
+        <p:nvPr/>
+      </p:nvGrpSpPr>
+      <p:grpSpPr>
+        <a:xfrm>
+          <a:off x="0" y="0"/>
+          <a:ext cx="0" cy="0"/>
+          <a:chOff x="0" y="0"/>
+          <a:chExt cx="0" cy="0"/>
+        </a:xfrm>
+      </p:grpSpPr>
+      <p:sp>
+        <p:nvSpPr>
+          <p:cNvPr id="2" name="Title 1"/>
+          <p:cNvSpPr>
+            <a:spLocks noGrp="1"/>
+          </p:cNvSpPr>
+          <p:nvPr>
+            <p:ph type="title"/>
+          </p:nvPr>
+        </p:nvSpPr>
+        <p:spPr/>
+        <p:txBody>
+          <a:bodyPr/>
+          <a:lstStyle/>
+          <a:p>
+            <a:pPr lvl="0" indent="0" marL="0">
+              <a:buNone/>
+            </a:pPr>
+            <a:r>
+              <a:rPr/>
+              <a:t>Moro Takeouts</a:t>
+            </a:r>
+          </a:p>
+        </p:txBody>
+      </p:sp>
+      <p:sp>
+        <p:nvSpPr>
+          <p:cNvPr id="3" name="Content Placeholder 2"/>
+          <p:cNvSpPr>
+            <a:spLocks noGrp="1"/>
+          </p:cNvSpPr>
+          <p:nvPr>
+            <p:ph idx="1"/>
+          </p:nvPr>
+        </p:nvSpPr>
+        <p:spPr/>
+        <p:txBody>
+          <a:bodyPr/>
+          <a:lstStyle/>
+          <a:p>
+            <a:pPr lvl="0"/>
+            <a:r>
+              <a:rPr/>
+              <a:t>Use RAG only if the question lies beyond the typical training data, if the knowledge we’re asking is not embedded in parameters, otherwise performances might get worse</a:t>
+            </a:r>
+          </a:p>
+        </p:txBody>
+      </p:sp>
+    </p:spTree>
+  </p:cSld>
+</p:sld>
+</file>
+
+<file path=ppt/slides/slide14.xml><?xml version="1.0" encoding="utf-8"?>
 <p:sld xmlns:a="http://schemas.openxmlformats.org/drawingml/2006/main" xmlns:r="http://schemas.openxmlformats.org/officeDocument/2006/relationships" xmlns:p="http://schemas.openxmlformats.org/presentationml/2006/main">
   <p:cSld>
     <p:spTree>
@@ -3600,6 +3727,36 @@
             <a:r>
               <a:rPr/>
               <a:t>Taxonomy of graph + llm contributions in literature</a:t>
+            </a:r>
+          </a:p>
+        </p:txBody>
+      </p:sp>
+      <p:sp>
+        <p:nvSpPr>
+          <p:cNvPr id="3" name="Content Placeholder 2"/>
+          <p:cNvSpPr>
+            <a:spLocks noGrp="1"/>
+          </p:cNvSpPr>
+          <p:nvPr>
+            <p:ph idx="1"/>
+          </p:nvPr>
+        </p:nvSpPr>
+        <p:spPr/>
+        <p:txBody>
+          <a:bodyPr/>
+          <a:lstStyle/>
+          <a:p>
+            <a:pPr lvl="0"/>
+            <a:r>
+              <a:rPr/>
+              <a:t>Una volta che embedd oe faccio rag e trovo qualcosa per similarità, lo passo comunque al LLM sotto forma testuale (?)</a:t>
+            </a:r>
+          </a:p>
+          <a:p>
+            <a:pPr lvl="0"/>
+            <a:r>
+              <a:rPr/>
+              <a:t>se uso node2vec e embeddo un nodo, come glielo passo (e.g. text? json?)</a:t>
             </a:r>
           </a:p>
         </p:txBody>

</xml_diff>

<commit_message>
Deploying to gh-pages from @ ManuelePasini/slides-markdown@34ae985fd37703aa1e60900cbc0438cfdf05c951 🚀
</commit_message>
<xml_diff>
--- a/graph_llm.pptx
+++ b/graph_llm.pptx
@@ -3687,8 +3687,8 @@
         </p:blipFill>
         <p:spPr bwMode="auto">
           <a:xfrm>
-            <a:off x="2692400" y="1193800"/>
-            <a:ext cx="3759200" cy="2882900"/>
+            <a:off x="2413000" y="1193800"/>
+            <a:ext cx="4318000" cy="2882900"/>
           </a:xfrm>
           <a:prstGeom prst="rect">
             <a:avLst/>
@@ -4722,8 +4722,8 @@
         </p:blipFill>
         <p:spPr bwMode="auto">
           <a:xfrm>
-            <a:off x="4648200" y="2095500"/>
-            <a:ext cx="4038600" cy="1066800"/>
+            <a:off x="4648200" y="1295400"/>
+            <a:ext cx="4038600" cy="2692400"/>
           </a:xfrm>
           <a:prstGeom prst="rect">
             <a:avLst/>

</xml_diff>